<commit_message>
added links to wireframe-presentation.pptx
</commit_message>
<xml_diff>
--- a/Docs/Version 1/wireframe/wireframe-presentation.pptx
+++ b/Docs/Version 1/wireframe/wireframe-presentation.pptx
@@ -3393,6 +3393,226 @@
           </a:xfrm>
         </p:spPr>
       </p:pic>
+      <p:sp>
+        <p:nvSpPr>
+          <p:cNvPr id="8" name="מלבן 7">
+            <a:hlinkClick r:id="rId3" action="ppaction://hlinksldjump"/>
+            <a:extLst>
+              <a:ext uri="{FF2B5EF4-FFF2-40B4-BE49-F238E27FC236}">
+                <a16:creationId xmlns:a16="http://schemas.microsoft.com/office/drawing/2014/main" id="{6B3D4DE6-E102-4183-6DA4-ED84238FABAF}"/>
+              </a:ext>
+            </a:extLst>
+          </p:cNvPr>
+          <p:cNvSpPr/>
+          <p:nvPr/>
+        </p:nvSpPr>
+        <p:spPr>
+          <a:xfrm>
+            <a:off x="8611437" y="2009670"/>
+            <a:ext cx="673240" cy="492370"/>
+          </a:xfrm>
+          <a:prstGeom prst="rect">
+            <a:avLst/>
+          </a:prstGeom>
+          <a:solidFill>
+            <a:srgbClr val="85DFFF">
+              <a:alpha val="25098"/>
+            </a:srgbClr>
+          </a:solidFill>
+          <a:ln>
+            <a:noFill/>
+          </a:ln>
+        </p:spPr>
+        <p:style>
+          <a:lnRef idx="2">
+            <a:schemeClr val="accent1">
+              <a:shade val="50000"/>
+            </a:schemeClr>
+          </a:lnRef>
+          <a:fillRef idx="1">
+            <a:schemeClr val="accent1"/>
+          </a:fillRef>
+          <a:effectRef idx="0">
+            <a:schemeClr val="accent1"/>
+          </a:effectRef>
+          <a:fontRef idx="minor">
+            <a:schemeClr val="lt1"/>
+          </a:fontRef>
+        </p:style>
+        <p:txBody>
+          <a:bodyPr rtlCol="1" anchor="ctr"/>
+          <a:lstStyle/>
+          <a:p>
+            <a:pPr algn="ctr"/>
+            <a:endParaRPr lang="he-IL"/>
+          </a:p>
+        </p:txBody>
+      </p:sp>
+      <p:sp>
+        <p:nvSpPr>
+          <p:cNvPr id="10" name="מלבן 9">
+            <a:hlinkClick r:id="rId4" action="ppaction://hlinksldjump"/>
+            <a:extLst>
+              <a:ext uri="{FF2B5EF4-FFF2-40B4-BE49-F238E27FC236}">
+                <a16:creationId xmlns:a16="http://schemas.microsoft.com/office/drawing/2014/main" id="{5BCD4259-F02D-A150-A00E-41CE7AA79332}"/>
+              </a:ext>
+            </a:extLst>
+          </p:cNvPr>
+          <p:cNvSpPr/>
+          <p:nvPr/>
+        </p:nvSpPr>
+        <p:spPr>
+          <a:xfrm>
+            <a:off x="9284677" y="2009670"/>
+            <a:ext cx="964642" cy="492370"/>
+          </a:xfrm>
+          <a:prstGeom prst="rect">
+            <a:avLst/>
+          </a:prstGeom>
+          <a:solidFill>
+            <a:srgbClr val="85DFFF">
+              <a:alpha val="25098"/>
+            </a:srgbClr>
+          </a:solidFill>
+          <a:ln>
+            <a:noFill/>
+          </a:ln>
+        </p:spPr>
+        <p:style>
+          <a:lnRef idx="2">
+            <a:schemeClr val="accent1">
+              <a:shade val="50000"/>
+            </a:schemeClr>
+          </a:lnRef>
+          <a:fillRef idx="1">
+            <a:schemeClr val="accent1"/>
+          </a:fillRef>
+          <a:effectRef idx="0">
+            <a:schemeClr val="accent1"/>
+          </a:effectRef>
+          <a:fontRef idx="minor">
+            <a:schemeClr val="lt1"/>
+          </a:fontRef>
+        </p:style>
+        <p:txBody>
+          <a:bodyPr rtlCol="1" anchor="ctr"/>
+          <a:lstStyle/>
+          <a:p>
+            <a:pPr algn="ctr"/>
+            <a:endParaRPr lang="he-IL"/>
+          </a:p>
+        </p:txBody>
+      </p:sp>
+      <p:sp>
+        <p:nvSpPr>
+          <p:cNvPr id="11" name="מלבן 10">
+            <a:hlinkClick r:id="rId5" action="ppaction://hlinksldjump"/>
+            <a:extLst>
+              <a:ext uri="{FF2B5EF4-FFF2-40B4-BE49-F238E27FC236}">
+                <a16:creationId xmlns:a16="http://schemas.microsoft.com/office/drawing/2014/main" id="{CE6DACBB-5E7C-E738-ACD1-94CDEEA22F75}"/>
+              </a:ext>
+            </a:extLst>
+          </p:cNvPr>
+          <p:cNvSpPr/>
+          <p:nvPr/>
+        </p:nvSpPr>
+        <p:spPr>
+          <a:xfrm>
+            <a:off x="5342597" y="2009670"/>
+            <a:ext cx="560363" cy="492370"/>
+          </a:xfrm>
+          <a:prstGeom prst="rect">
+            <a:avLst/>
+          </a:prstGeom>
+          <a:solidFill>
+            <a:srgbClr val="85DFFF">
+              <a:alpha val="25098"/>
+            </a:srgbClr>
+          </a:solidFill>
+          <a:ln>
+            <a:noFill/>
+          </a:ln>
+        </p:spPr>
+        <p:style>
+          <a:lnRef idx="2">
+            <a:schemeClr val="accent1">
+              <a:shade val="50000"/>
+            </a:schemeClr>
+          </a:lnRef>
+          <a:fillRef idx="1">
+            <a:schemeClr val="accent1"/>
+          </a:fillRef>
+          <a:effectRef idx="0">
+            <a:schemeClr val="accent1"/>
+          </a:effectRef>
+          <a:fontRef idx="minor">
+            <a:schemeClr val="lt1"/>
+          </a:fontRef>
+        </p:style>
+        <p:txBody>
+          <a:bodyPr rtlCol="1" anchor="ctr"/>
+          <a:lstStyle/>
+          <a:p>
+            <a:pPr algn="ctr"/>
+            <a:endParaRPr lang="he-IL"/>
+          </a:p>
+        </p:txBody>
+      </p:sp>
+      <p:sp>
+        <p:nvSpPr>
+          <p:cNvPr id="12" name="מלבן 11">
+            <a:hlinkClick r:id="rId6" action="ppaction://hlinksldjump"/>
+            <a:extLst>
+              <a:ext uri="{FF2B5EF4-FFF2-40B4-BE49-F238E27FC236}">
+                <a16:creationId xmlns:a16="http://schemas.microsoft.com/office/drawing/2014/main" id="{06BF2933-8D77-6A55-829D-0C7FEF3EFA9D}"/>
+              </a:ext>
+            </a:extLst>
+          </p:cNvPr>
+          <p:cNvSpPr/>
+          <p:nvPr/>
+        </p:nvSpPr>
+        <p:spPr>
+          <a:xfrm>
+            <a:off x="2001520" y="2010340"/>
+            <a:ext cx="905803" cy="530330"/>
+          </a:xfrm>
+          <a:prstGeom prst="rect">
+            <a:avLst/>
+          </a:prstGeom>
+          <a:solidFill>
+            <a:srgbClr val="85DFFF">
+              <a:alpha val="25098"/>
+            </a:srgbClr>
+          </a:solidFill>
+          <a:ln>
+            <a:noFill/>
+          </a:ln>
+        </p:spPr>
+        <p:style>
+          <a:lnRef idx="2">
+            <a:schemeClr val="accent1">
+              <a:shade val="50000"/>
+            </a:schemeClr>
+          </a:lnRef>
+          <a:fillRef idx="1">
+            <a:schemeClr val="accent1"/>
+          </a:fillRef>
+          <a:effectRef idx="0">
+            <a:schemeClr val="accent1"/>
+          </a:effectRef>
+          <a:fontRef idx="minor">
+            <a:schemeClr val="lt1"/>
+          </a:fontRef>
+        </p:style>
+        <p:txBody>
+          <a:bodyPr rtlCol="1" anchor="ctr"/>
+          <a:lstStyle/>
+          <a:p>
+            <a:pPr algn="ctr"/>
+            <a:endParaRPr lang="he-IL"/>
+          </a:p>
+        </p:txBody>
+      </p:sp>
     </p:spTree>
     <p:extLst>
       <p:ext uri="{BB962C8B-B14F-4D97-AF65-F5344CB8AC3E}">
@@ -3482,6 +3702,171 @@
           </a:xfrm>
         </p:spPr>
       </p:pic>
+      <p:sp>
+        <p:nvSpPr>
+          <p:cNvPr id="6" name="מלבן 5">
+            <a:hlinkClick r:id="rId3" action="ppaction://hlinksldjump"/>
+            <a:extLst>
+              <a:ext uri="{FF2B5EF4-FFF2-40B4-BE49-F238E27FC236}">
+                <a16:creationId xmlns:a16="http://schemas.microsoft.com/office/drawing/2014/main" id="{276DE5A0-D7DF-CA57-1E29-86266A645D86}"/>
+              </a:ext>
+            </a:extLst>
+          </p:cNvPr>
+          <p:cNvSpPr/>
+          <p:nvPr/>
+        </p:nvSpPr>
+        <p:spPr>
+          <a:xfrm>
+            <a:off x="2030437" y="2019830"/>
+            <a:ext cx="905803" cy="530330"/>
+          </a:xfrm>
+          <a:prstGeom prst="rect">
+            <a:avLst/>
+          </a:prstGeom>
+          <a:solidFill>
+            <a:srgbClr val="85DFFF">
+              <a:alpha val="25098"/>
+            </a:srgbClr>
+          </a:solidFill>
+          <a:ln>
+            <a:noFill/>
+          </a:ln>
+        </p:spPr>
+        <p:style>
+          <a:lnRef idx="2">
+            <a:schemeClr val="accent1">
+              <a:shade val="50000"/>
+            </a:schemeClr>
+          </a:lnRef>
+          <a:fillRef idx="1">
+            <a:schemeClr val="accent1"/>
+          </a:fillRef>
+          <a:effectRef idx="0">
+            <a:schemeClr val="accent1"/>
+          </a:effectRef>
+          <a:fontRef idx="minor">
+            <a:schemeClr val="lt1"/>
+          </a:fontRef>
+        </p:style>
+        <p:txBody>
+          <a:bodyPr rtlCol="1" anchor="ctr"/>
+          <a:lstStyle/>
+          <a:p>
+            <a:pPr algn="ctr"/>
+            <a:endParaRPr lang="he-IL"/>
+          </a:p>
+        </p:txBody>
+      </p:sp>
+      <p:sp>
+        <p:nvSpPr>
+          <p:cNvPr id="7" name="מלבן 6">
+            <a:hlinkClick r:id="rId4" action="ppaction://hlinksldjump"/>
+            <a:extLst>
+              <a:ext uri="{FF2B5EF4-FFF2-40B4-BE49-F238E27FC236}">
+                <a16:creationId xmlns:a16="http://schemas.microsoft.com/office/drawing/2014/main" id="{FD2FAFAF-BF22-B2AB-32FE-0D49E55C4C0A}"/>
+              </a:ext>
+            </a:extLst>
+          </p:cNvPr>
+          <p:cNvSpPr/>
+          <p:nvPr/>
+        </p:nvSpPr>
+        <p:spPr>
+          <a:xfrm>
+            <a:off x="6643078" y="4954728"/>
+            <a:ext cx="1149642" cy="592632"/>
+          </a:xfrm>
+          <a:prstGeom prst="rect">
+            <a:avLst/>
+          </a:prstGeom>
+          <a:solidFill>
+            <a:srgbClr val="85DFFF">
+              <a:alpha val="25098"/>
+            </a:srgbClr>
+          </a:solidFill>
+          <a:ln>
+            <a:noFill/>
+          </a:ln>
+        </p:spPr>
+        <p:style>
+          <a:lnRef idx="2">
+            <a:schemeClr val="accent1">
+              <a:shade val="50000"/>
+            </a:schemeClr>
+          </a:lnRef>
+          <a:fillRef idx="1">
+            <a:schemeClr val="accent1"/>
+          </a:fillRef>
+          <a:effectRef idx="0">
+            <a:schemeClr val="accent1"/>
+          </a:effectRef>
+          <a:fontRef idx="minor">
+            <a:schemeClr val="lt1"/>
+          </a:fontRef>
+        </p:style>
+        <p:txBody>
+          <a:bodyPr rtlCol="1" anchor="ctr"/>
+          <a:lstStyle/>
+          <a:p>
+            <a:pPr algn="ctr"/>
+            <a:endParaRPr lang="he-IL"/>
+          </a:p>
+        </p:txBody>
+      </p:sp>
+      <p:sp>
+        <p:nvSpPr>
+          <p:cNvPr id="8" name="מלבן 7">
+            <a:hlinkClick r:id="rId3" action="ppaction://hlinksldjump"/>
+            <a:extLst>
+              <a:ext uri="{FF2B5EF4-FFF2-40B4-BE49-F238E27FC236}">
+                <a16:creationId xmlns:a16="http://schemas.microsoft.com/office/drawing/2014/main" id="{9B0AE41B-729E-2B0D-080A-6088C0073B04}"/>
+              </a:ext>
+            </a:extLst>
+          </p:cNvPr>
+          <p:cNvSpPr/>
+          <p:nvPr/>
+        </p:nvSpPr>
+        <p:spPr>
+          <a:xfrm>
+            <a:off x="4399281" y="4853128"/>
+            <a:ext cx="1149642" cy="592632"/>
+          </a:xfrm>
+          <a:prstGeom prst="rect">
+            <a:avLst/>
+          </a:prstGeom>
+          <a:solidFill>
+            <a:srgbClr val="85DFFF">
+              <a:alpha val="25098"/>
+            </a:srgbClr>
+          </a:solidFill>
+          <a:ln>
+            <a:noFill/>
+          </a:ln>
+        </p:spPr>
+        <p:style>
+          <a:lnRef idx="2">
+            <a:schemeClr val="accent1">
+              <a:shade val="50000"/>
+            </a:schemeClr>
+          </a:lnRef>
+          <a:fillRef idx="1">
+            <a:schemeClr val="accent1"/>
+          </a:fillRef>
+          <a:effectRef idx="0">
+            <a:schemeClr val="accent1"/>
+          </a:effectRef>
+          <a:fontRef idx="minor">
+            <a:schemeClr val="lt1"/>
+          </a:fontRef>
+        </p:style>
+        <p:txBody>
+          <a:bodyPr rtlCol="1" anchor="ctr"/>
+          <a:lstStyle/>
+          <a:p>
+            <a:pPr algn="ctr"/>
+            <a:endParaRPr lang="he-IL"/>
+          </a:p>
+        </p:txBody>
+      </p:sp>
     </p:spTree>
     <p:extLst>
       <p:ext uri="{BB962C8B-B14F-4D97-AF65-F5344CB8AC3E}">
@@ -3571,6 +3956,116 @@
           </a:xfrm>
         </p:spPr>
       </p:pic>
+      <p:sp>
+        <p:nvSpPr>
+          <p:cNvPr id="6" name="מלבן 5">
+            <a:hlinkClick r:id="rId3" action="ppaction://hlinksldjump"/>
+            <a:extLst>
+              <a:ext uri="{FF2B5EF4-FFF2-40B4-BE49-F238E27FC236}">
+                <a16:creationId xmlns:a16="http://schemas.microsoft.com/office/drawing/2014/main" id="{CED8FC58-A821-B10C-9ADA-E1871603B8DC}"/>
+              </a:ext>
+            </a:extLst>
+          </p:cNvPr>
+          <p:cNvSpPr/>
+          <p:nvPr/>
+        </p:nvSpPr>
+        <p:spPr>
+          <a:xfrm>
+            <a:off x="2030437" y="2019830"/>
+            <a:ext cx="905803" cy="530330"/>
+          </a:xfrm>
+          <a:prstGeom prst="rect">
+            <a:avLst/>
+          </a:prstGeom>
+          <a:solidFill>
+            <a:srgbClr val="85DFFF">
+              <a:alpha val="25098"/>
+            </a:srgbClr>
+          </a:solidFill>
+          <a:ln>
+            <a:noFill/>
+          </a:ln>
+        </p:spPr>
+        <p:style>
+          <a:lnRef idx="2">
+            <a:schemeClr val="accent1">
+              <a:shade val="50000"/>
+            </a:schemeClr>
+          </a:lnRef>
+          <a:fillRef idx="1">
+            <a:schemeClr val="accent1"/>
+          </a:fillRef>
+          <a:effectRef idx="0">
+            <a:schemeClr val="accent1"/>
+          </a:effectRef>
+          <a:fontRef idx="minor">
+            <a:schemeClr val="lt1"/>
+          </a:fontRef>
+        </p:style>
+        <p:txBody>
+          <a:bodyPr rtlCol="1" anchor="ctr"/>
+          <a:lstStyle/>
+          <a:p>
+            <a:pPr algn="ctr"/>
+            <a:endParaRPr lang="he-IL"/>
+          </a:p>
+        </p:txBody>
+      </p:sp>
+      <p:sp>
+        <p:nvSpPr>
+          <p:cNvPr id="7" name="מלבן 6">
+            <a:hlinkClick r:id="rId4" action="ppaction://hlinksldjump"/>
+            <a:extLst>
+              <a:ext uri="{FF2B5EF4-FFF2-40B4-BE49-F238E27FC236}">
+                <a16:creationId xmlns:a16="http://schemas.microsoft.com/office/drawing/2014/main" id="{872B5002-83A5-FF3E-A940-B6735E525677}"/>
+              </a:ext>
+            </a:extLst>
+          </p:cNvPr>
+          <p:cNvSpPr/>
+          <p:nvPr/>
+        </p:nvSpPr>
+        <p:spPr>
+          <a:xfrm>
+            <a:off x="5525478" y="5300168"/>
+            <a:ext cx="1271562" cy="419912"/>
+          </a:xfrm>
+          <a:prstGeom prst="rect">
+            <a:avLst/>
+          </a:prstGeom>
+          <a:solidFill>
+            <a:srgbClr val="85DFFF">
+              <a:alpha val="25098"/>
+            </a:srgbClr>
+          </a:solidFill>
+          <a:ln>
+            <a:noFill/>
+          </a:ln>
+        </p:spPr>
+        <p:style>
+          <a:lnRef idx="2">
+            <a:schemeClr val="accent1">
+              <a:shade val="50000"/>
+            </a:schemeClr>
+          </a:lnRef>
+          <a:fillRef idx="1">
+            <a:schemeClr val="accent1"/>
+          </a:fillRef>
+          <a:effectRef idx="0">
+            <a:schemeClr val="accent1"/>
+          </a:effectRef>
+          <a:fontRef idx="minor">
+            <a:schemeClr val="lt1"/>
+          </a:fontRef>
+        </p:style>
+        <p:txBody>
+          <a:bodyPr rtlCol="1" anchor="ctr"/>
+          <a:lstStyle/>
+          <a:p>
+            <a:pPr algn="ctr"/>
+            <a:endParaRPr lang="he-IL"/>
+          </a:p>
+        </p:txBody>
+      </p:sp>
     </p:spTree>
     <p:extLst>
       <p:ext uri="{BB962C8B-B14F-4D97-AF65-F5344CB8AC3E}">
@@ -3660,6 +4155,61 @@
           </a:xfrm>
         </p:spPr>
       </p:pic>
+      <p:sp>
+        <p:nvSpPr>
+          <p:cNvPr id="8" name="מלבן 7">
+            <a:hlinkClick r:id="rId3" action="ppaction://hlinksldjump"/>
+            <a:extLst>
+              <a:ext uri="{FF2B5EF4-FFF2-40B4-BE49-F238E27FC236}">
+                <a16:creationId xmlns:a16="http://schemas.microsoft.com/office/drawing/2014/main" id="{16C65EFC-BB6D-7B5D-9028-3167EA1A5BC6}"/>
+              </a:ext>
+            </a:extLst>
+          </p:cNvPr>
+          <p:cNvSpPr/>
+          <p:nvPr/>
+        </p:nvSpPr>
+        <p:spPr>
+          <a:xfrm>
+            <a:off x="2030437" y="2019830"/>
+            <a:ext cx="905803" cy="530330"/>
+          </a:xfrm>
+          <a:prstGeom prst="rect">
+            <a:avLst/>
+          </a:prstGeom>
+          <a:solidFill>
+            <a:srgbClr val="85DFFF">
+              <a:alpha val="25098"/>
+            </a:srgbClr>
+          </a:solidFill>
+          <a:ln>
+            <a:noFill/>
+          </a:ln>
+        </p:spPr>
+        <p:style>
+          <a:lnRef idx="2">
+            <a:schemeClr val="accent1">
+              <a:shade val="50000"/>
+            </a:schemeClr>
+          </a:lnRef>
+          <a:fillRef idx="1">
+            <a:schemeClr val="accent1"/>
+          </a:fillRef>
+          <a:effectRef idx="0">
+            <a:schemeClr val="accent1"/>
+          </a:effectRef>
+          <a:fontRef idx="minor">
+            <a:schemeClr val="lt1"/>
+          </a:fontRef>
+        </p:style>
+        <p:txBody>
+          <a:bodyPr rtlCol="1" anchor="ctr"/>
+          <a:lstStyle/>
+          <a:p>
+            <a:pPr algn="ctr"/>
+            <a:endParaRPr lang="he-IL"/>
+          </a:p>
+        </p:txBody>
+      </p:sp>
     </p:spTree>
     <p:extLst>
       <p:ext uri="{BB962C8B-B14F-4D97-AF65-F5344CB8AC3E}">
@@ -3749,6 +4299,61 @@
           </a:xfrm>
         </p:spPr>
       </p:pic>
+      <p:sp>
+        <p:nvSpPr>
+          <p:cNvPr id="6" name="מלבן 5">
+            <a:hlinkClick r:id="rId3" action="ppaction://hlinksldjump"/>
+            <a:extLst>
+              <a:ext uri="{FF2B5EF4-FFF2-40B4-BE49-F238E27FC236}">
+                <a16:creationId xmlns:a16="http://schemas.microsoft.com/office/drawing/2014/main" id="{47EF60A3-DB50-DC44-B240-45D8A1A37C38}"/>
+              </a:ext>
+            </a:extLst>
+          </p:cNvPr>
+          <p:cNvSpPr/>
+          <p:nvPr/>
+        </p:nvSpPr>
+        <p:spPr>
+          <a:xfrm>
+            <a:off x="2030437" y="2019830"/>
+            <a:ext cx="905803" cy="530330"/>
+          </a:xfrm>
+          <a:prstGeom prst="rect">
+            <a:avLst/>
+          </a:prstGeom>
+          <a:solidFill>
+            <a:srgbClr val="85DFFF">
+              <a:alpha val="25098"/>
+            </a:srgbClr>
+          </a:solidFill>
+          <a:ln>
+            <a:noFill/>
+          </a:ln>
+        </p:spPr>
+        <p:style>
+          <a:lnRef idx="2">
+            <a:schemeClr val="accent1">
+              <a:shade val="50000"/>
+            </a:schemeClr>
+          </a:lnRef>
+          <a:fillRef idx="1">
+            <a:schemeClr val="accent1"/>
+          </a:fillRef>
+          <a:effectRef idx="0">
+            <a:schemeClr val="accent1"/>
+          </a:effectRef>
+          <a:fontRef idx="minor">
+            <a:schemeClr val="lt1"/>
+          </a:fontRef>
+        </p:style>
+        <p:txBody>
+          <a:bodyPr rtlCol="1" anchor="ctr"/>
+          <a:lstStyle/>
+          <a:p>
+            <a:pPr algn="ctr"/>
+            <a:endParaRPr lang="he-IL"/>
+          </a:p>
+        </p:txBody>
+      </p:sp>
     </p:spTree>
     <p:extLst>
       <p:ext uri="{BB962C8B-B14F-4D97-AF65-F5344CB8AC3E}">
@@ -3838,6 +4443,61 @@
           </a:xfrm>
         </p:spPr>
       </p:pic>
+      <p:sp>
+        <p:nvSpPr>
+          <p:cNvPr id="6" name="מלבן 5">
+            <a:hlinkClick r:id="rId3" action="ppaction://hlinksldjump"/>
+            <a:extLst>
+              <a:ext uri="{FF2B5EF4-FFF2-40B4-BE49-F238E27FC236}">
+                <a16:creationId xmlns:a16="http://schemas.microsoft.com/office/drawing/2014/main" id="{7B49A8FE-9064-25CF-26A0-A93447C0F6FE}"/>
+              </a:ext>
+            </a:extLst>
+          </p:cNvPr>
+          <p:cNvSpPr/>
+          <p:nvPr/>
+        </p:nvSpPr>
+        <p:spPr>
+          <a:xfrm>
+            <a:off x="2030437" y="2019830"/>
+            <a:ext cx="905803" cy="530330"/>
+          </a:xfrm>
+          <a:prstGeom prst="rect">
+            <a:avLst/>
+          </a:prstGeom>
+          <a:solidFill>
+            <a:srgbClr val="85DFFF">
+              <a:alpha val="25098"/>
+            </a:srgbClr>
+          </a:solidFill>
+          <a:ln>
+            <a:noFill/>
+          </a:ln>
+        </p:spPr>
+        <p:style>
+          <a:lnRef idx="2">
+            <a:schemeClr val="accent1">
+              <a:shade val="50000"/>
+            </a:schemeClr>
+          </a:lnRef>
+          <a:fillRef idx="1">
+            <a:schemeClr val="accent1"/>
+          </a:fillRef>
+          <a:effectRef idx="0">
+            <a:schemeClr val="accent1"/>
+          </a:effectRef>
+          <a:fontRef idx="minor">
+            <a:schemeClr val="lt1"/>
+          </a:fontRef>
+        </p:style>
+        <p:txBody>
+          <a:bodyPr rtlCol="1" anchor="ctr"/>
+          <a:lstStyle/>
+          <a:p>
+            <a:pPr algn="ctr"/>
+            <a:endParaRPr lang="he-IL"/>
+          </a:p>
+        </p:txBody>
+      </p:sp>
     </p:spTree>
     <p:extLst>
       <p:ext uri="{BB962C8B-B14F-4D97-AF65-F5344CB8AC3E}">
@@ -3927,6 +4587,365 @@
           </a:xfrm>
         </p:spPr>
       </p:pic>
+      <p:pic>
+        <p:nvPicPr>
+          <p:cNvPr id="6" name="מציין מיקום תוכן 6">
+            <a:extLst>
+              <a:ext uri="{FF2B5EF4-FFF2-40B4-BE49-F238E27FC236}">
+                <a16:creationId xmlns:a16="http://schemas.microsoft.com/office/drawing/2014/main" id="{5224BF30-D21A-E1B7-3366-437298F852C2}"/>
+              </a:ext>
+            </a:extLst>
+          </p:cNvPr>
+          <p:cNvPicPr>
+            <a:picLocks noChangeAspect="1"/>
+          </p:cNvPicPr>
+          <p:nvPr/>
+        </p:nvPicPr>
+        <p:blipFill rotWithShape="1">
+          <a:blip r:embed="rId3"/>
+          <a:srcRect b="80309"/>
+          <a:stretch/>
+        </p:blipFill>
+        <p:spPr>
+          <a:xfrm>
+            <a:off x="1766203" y="1494491"/>
+            <a:ext cx="8659594" cy="856823"/>
+          </a:xfrm>
+          <a:prstGeom prst="rect">
+            <a:avLst/>
+          </a:prstGeom>
+        </p:spPr>
+      </p:pic>
+      <p:sp>
+        <p:nvSpPr>
+          <p:cNvPr id="7" name="מלבן 6">
+            <a:hlinkClick r:id="rId4" action="ppaction://hlinksldjump"/>
+            <a:extLst>
+              <a:ext uri="{FF2B5EF4-FFF2-40B4-BE49-F238E27FC236}">
+                <a16:creationId xmlns:a16="http://schemas.microsoft.com/office/drawing/2014/main" id="{8BEDF853-D602-06F5-F112-A2717DED77B5}"/>
+              </a:ext>
+            </a:extLst>
+          </p:cNvPr>
+          <p:cNvSpPr/>
+          <p:nvPr/>
+        </p:nvSpPr>
+        <p:spPr>
+          <a:xfrm>
+            <a:off x="8533395" y="1676717"/>
+            <a:ext cx="673240" cy="492370"/>
+          </a:xfrm>
+          <a:prstGeom prst="rect">
+            <a:avLst/>
+          </a:prstGeom>
+          <a:solidFill>
+            <a:srgbClr val="85DFFF">
+              <a:alpha val="25098"/>
+            </a:srgbClr>
+          </a:solidFill>
+          <a:ln>
+            <a:noFill/>
+          </a:ln>
+        </p:spPr>
+        <p:style>
+          <a:lnRef idx="2">
+            <a:schemeClr val="accent1">
+              <a:shade val="50000"/>
+            </a:schemeClr>
+          </a:lnRef>
+          <a:fillRef idx="1">
+            <a:schemeClr val="accent1"/>
+          </a:fillRef>
+          <a:effectRef idx="0">
+            <a:schemeClr val="accent1"/>
+          </a:effectRef>
+          <a:fontRef idx="minor">
+            <a:schemeClr val="lt1"/>
+          </a:fontRef>
+        </p:style>
+        <p:txBody>
+          <a:bodyPr rtlCol="1" anchor="ctr"/>
+          <a:lstStyle/>
+          <a:p>
+            <a:pPr algn="ctr"/>
+            <a:endParaRPr lang="he-IL"/>
+          </a:p>
+        </p:txBody>
+      </p:sp>
+      <p:sp>
+        <p:nvSpPr>
+          <p:cNvPr id="8" name="מלבן 7">
+            <a:hlinkClick r:id="rId5" action="ppaction://hlinksldjump"/>
+            <a:extLst>
+              <a:ext uri="{FF2B5EF4-FFF2-40B4-BE49-F238E27FC236}">
+                <a16:creationId xmlns:a16="http://schemas.microsoft.com/office/drawing/2014/main" id="{FFB9AA1E-9CAA-07E8-A4F7-E8F10FB1F7DA}"/>
+              </a:ext>
+            </a:extLst>
+          </p:cNvPr>
+          <p:cNvSpPr/>
+          <p:nvPr/>
+        </p:nvSpPr>
+        <p:spPr>
+          <a:xfrm>
+            <a:off x="9206635" y="1690688"/>
+            <a:ext cx="964642" cy="492370"/>
+          </a:xfrm>
+          <a:prstGeom prst="rect">
+            <a:avLst/>
+          </a:prstGeom>
+          <a:solidFill>
+            <a:srgbClr val="85DFFF">
+              <a:alpha val="25098"/>
+            </a:srgbClr>
+          </a:solidFill>
+          <a:ln>
+            <a:noFill/>
+          </a:ln>
+        </p:spPr>
+        <p:style>
+          <a:lnRef idx="2">
+            <a:schemeClr val="accent1">
+              <a:shade val="50000"/>
+            </a:schemeClr>
+          </a:lnRef>
+          <a:fillRef idx="1">
+            <a:schemeClr val="accent1"/>
+          </a:fillRef>
+          <a:effectRef idx="0">
+            <a:schemeClr val="accent1"/>
+          </a:effectRef>
+          <a:fontRef idx="minor">
+            <a:schemeClr val="lt1"/>
+          </a:fontRef>
+        </p:style>
+        <p:txBody>
+          <a:bodyPr rtlCol="1" anchor="ctr"/>
+          <a:lstStyle/>
+          <a:p>
+            <a:pPr algn="ctr"/>
+            <a:endParaRPr lang="he-IL"/>
+          </a:p>
+        </p:txBody>
+      </p:sp>
+      <p:sp>
+        <p:nvSpPr>
+          <p:cNvPr id="9" name="מלבן 8">
+            <a:hlinkClick r:id="rId6" action="ppaction://hlinksldjump"/>
+            <a:extLst>
+              <a:ext uri="{FF2B5EF4-FFF2-40B4-BE49-F238E27FC236}">
+                <a16:creationId xmlns:a16="http://schemas.microsoft.com/office/drawing/2014/main" id="{999FFE21-1D37-B792-850C-77AD4BA2D5EA}"/>
+              </a:ext>
+            </a:extLst>
+          </p:cNvPr>
+          <p:cNvSpPr/>
+          <p:nvPr/>
+        </p:nvSpPr>
+        <p:spPr>
+          <a:xfrm>
+            <a:off x="5312117" y="1667193"/>
+            <a:ext cx="560363" cy="492370"/>
+          </a:xfrm>
+          <a:prstGeom prst="rect">
+            <a:avLst/>
+          </a:prstGeom>
+          <a:solidFill>
+            <a:srgbClr val="85DFFF">
+              <a:alpha val="25098"/>
+            </a:srgbClr>
+          </a:solidFill>
+          <a:ln>
+            <a:noFill/>
+          </a:ln>
+        </p:spPr>
+        <p:style>
+          <a:lnRef idx="2">
+            <a:schemeClr val="accent1">
+              <a:shade val="50000"/>
+            </a:schemeClr>
+          </a:lnRef>
+          <a:fillRef idx="1">
+            <a:schemeClr val="accent1"/>
+          </a:fillRef>
+          <a:effectRef idx="0">
+            <a:schemeClr val="accent1"/>
+          </a:effectRef>
+          <a:fontRef idx="minor">
+            <a:schemeClr val="lt1"/>
+          </a:fontRef>
+        </p:style>
+        <p:txBody>
+          <a:bodyPr rtlCol="1" anchor="ctr"/>
+          <a:lstStyle/>
+          <a:p>
+            <a:pPr algn="ctr"/>
+            <a:endParaRPr lang="he-IL"/>
+          </a:p>
+        </p:txBody>
+      </p:sp>
+      <p:sp>
+        <p:nvSpPr>
+          <p:cNvPr id="10" name="מלבן 9">
+            <a:hlinkClick r:id="rId7" action="ppaction://hlinksldjump"/>
+            <a:extLst>
+              <a:ext uri="{FF2B5EF4-FFF2-40B4-BE49-F238E27FC236}">
+                <a16:creationId xmlns:a16="http://schemas.microsoft.com/office/drawing/2014/main" id="{D7BF6160-5920-6A7E-46E2-0A0737FEE74F}"/>
+              </a:ext>
+            </a:extLst>
+          </p:cNvPr>
+          <p:cNvSpPr/>
+          <p:nvPr/>
+        </p:nvSpPr>
+        <p:spPr>
+          <a:xfrm>
+            <a:off x="2021840" y="1652728"/>
+            <a:ext cx="905803" cy="530330"/>
+          </a:xfrm>
+          <a:prstGeom prst="rect">
+            <a:avLst/>
+          </a:prstGeom>
+          <a:solidFill>
+            <a:srgbClr val="85DFFF">
+              <a:alpha val="25098"/>
+            </a:srgbClr>
+          </a:solidFill>
+          <a:ln>
+            <a:noFill/>
+          </a:ln>
+        </p:spPr>
+        <p:style>
+          <a:lnRef idx="2">
+            <a:schemeClr val="accent1">
+              <a:shade val="50000"/>
+            </a:schemeClr>
+          </a:lnRef>
+          <a:fillRef idx="1">
+            <a:schemeClr val="accent1"/>
+          </a:fillRef>
+          <a:effectRef idx="0">
+            <a:schemeClr val="accent1"/>
+          </a:effectRef>
+          <a:fontRef idx="minor">
+            <a:schemeClr val="lt1"/>
+          </a:fontRef>
+        </p:style>
+        <p:txBody>
+          <a:bodyPr rtlCol="1" anchor="ctr"/>
+          <a:lstStyle/>
+          <a:p>
+            <a:pPr algn="ctr"/>
+            <a:endParaRPr lang="he-IL"/>
+          </a:p>
+        </p:txBody>
+      </p:sp>
+      <p:sp>
+        <p:nvSpPr>
+          <p:cNvPr id="11" name="מלבן 10">
+            <a:hlinkClick r:id="rId8" action="ppaction://hlinksldjump"/>
+            <a:extLst>
+              <a:ext uri="{FF2B5EF4-FFF2-40B4-BE49-F238E27FC236}">
+                <a16:creationId xmlns:a16="http://schemas.microsoft.com/office/drawing/2014/main" id="{81E9460D-F888-5E2E-EDB2-0E5D85847171}"/>
+              </a:ext>
+            </a:extLst>
+          </p:cNvPr>
+          <p:cNvSpPr/>
+          <p:nvPr/>
+        </p:nvSpPr>
+        <p:spPr>
+          <a:xfrm>
+            <a:off x="5312116" y="4871139"/>
+            <a:ext cx="1759243" cy="492370"/>
+          </a:xfrm>
+          <a:prstGeom prst="rect">
+            <a:avLst/>
+          </a:prstGeom>
+          <a:solidFill>
+            <a:srgbClr val="85DFFF">
+              <a:alpha val="25098"/>
+            </a:srgbClr>
+          </a:solidFill>
+          <a:ln>
+            <a:noFill/>
+          </a:ln>
+        </p:spPr>
+        <p:style>
+          <a:lnRef idx="2">
+            <a:schemeClr val="accent1">
+              <a:shade val="50000"/>
+            </a:schemeClr>
+          </a:lnRef>
+          <a:fillRef idx="1">
+            <a:schemeClr val="accent1"/>
+          </a:fillRef>
+          <a:effectRef idx="0">
+            <a:schemeClr val="accent1"/>
+          </a:effectRef>
+          <a:fontRef idx="minor">
+            <a:schemeClr val="lt1"/>
+          </a:fontRef>
+        </p:style>
+        <p:txBody>
+          <a:bodyPr rtlCol="1" anchor="ctr"/>
+          <a:lstStyle/>
+          <a:p>
+            <a:pPr algn="ctr"/>
+            <a:endParaRPr lang="he-IL"/>
+          </a:p>
+        </p:txBody>
+      </p:sp>
+      <p:sp>
+        <p:nvSpPr>
+          <p:cNvPr id="12" name="מלבן 11">
+            <a:hlinkClick r:id="rId5" action="ppaction://hlinksldjump"/>
+            <a:extLst>
+              <a:ext uri="{FF2B5EF4-FFF2-40B4-BE49-F238E27FC236}">
+                <a16:creationId xmlns:a16="http://schemas.microsoft.com/office/drawing/2014/main" id="{4588DAAB-9532-2F6D-3675-DC93D470ADF7}"/>
+              </a:ext>
+            </a:extLst>
+          </p:cNvPr>
+          <p:cNvSpPr/>
+          <p:nvPr/>
+        </p:nvSpPr>
+        <p:spPr>
+          <a:xfrm>
+            <a:off x="4347474" y="5409792"/>
+            <a:ext cx="4390126" cy="492370"/>
+          </a:xfrm>
+          <a:prstGeom prst="rect">
+            <a:avLst/>
+          </a:prstGeom>
+          <a:solidFill>
+            <a:srgbClr val="85DFFF">
+              <a:alpha val="25098"/>
+            </a:srgbClr>
+          </a:solidFill>
+          <a:ln>
+            <a:noFill/>
+          </a:ln>
+        </p:spPr>
+        <p:style>
+          <a:lnRef idx="2">
+            <a:schemeClr val="accent1">
+              <a:shade val="50000"/>
+            </a:schemeClr>
+          </a:lnRef>
+          <a:fillRef idx="1">
+            <a:schemeClr val="accent1"/>
+          </a:fillRef>
+          <a:effectRef idx="0">
+            <a:schemeClr val="accent1"/>
+          </a:effectRef>
+          <a:fontRef idx="minor">
+            <a:schemeClr val="lt1"/>
+          </a:fontRef>
+        </p:style>
+        <p:txBody>
+          <a:bodyPr rtlCol="1" anchor="ctr"/>
+          <a:lstStyle/>
+          <a:p>
+            <a:pPr algn="ctr"/>
+            <a:endParaRPr lang="he-IL"/>
+          </a:p>
+        </p:txBody>
+      </p:sp>
     </p:spTree>
     <p:extLst>
       <p:ext uri="{BB962C8B-B14F-4D97-AF65-F5344CB8AC3E}">
@@ -4016,6 +5035,365 @@
           </a:xfrm>
         </p:spPr>
       </p:pic>
+      <p:pic>
+        <p:nvPicPr>
+          <p:cNvPr id="6" name="מציין מיקום תוכן 6">
+            <a:extLst>
+              <a:ext uri="{FF2B5EF4-FFF2-40B4-BE49-F238E27FC236}">
+                <a16:creationId xmlns:a16="http://schemas.microsoft.com/office/drawing/2014/main" id="{254C546A-4986-241F-EC13-6BEEB9D9A9DD}"/>
+              </a:ext>
+            </a:extLst>
+          </p:cNvPr>
+          <p:cNvPicPr>
+            <a:picLocks noChangeAspect="1"/>
+          </p:cNvPicPr>
+          <p:nvPr/>
+        </p:nvPicPr>
+        <p:blipFill rotWithShape="1">
+          <a:blip r:embed="rId3"/>
+          <a:srcRect b="80309"/>
+          <a:stretch/>
+        </p:blipFill>
+        <p:spPr>
+          <a:xfrm>
+            <a:off x="1766203" y="1494491"/>
+            <a:ext cx="8659594" cy="856823"/>
+          </a:xfrm>
+          <a:prstGeom prst="rect">
+            <a:avLst/>
+          </a:prstGeom>
+        </p:spPr>
+      </p:pic>
+      <p:sp>
+        <p:nvSpPr>
+          <p:cNvPr id="7" name="מלבן 6">
+            <a:hlinkClick r:id="rId4" action="ppaction://hlinksldjump"/>
+            <a:extLst>
+              <a:ext uri="{FF2B5EF4-FFF2-40B4-BE49-F238E27FC236}">
+                <a16:creationId xmlns:a16="http://schemas.microsoft.com/office/drawing/2014/main" id="{158FA8A8-392C-D6B9-7FAC-8A4873061F3F}"/>
+              </a:ext>
+            </a:extLst>
+          </p:cNvPr>
+          <p:cNvSpPr/>
+          <p:nvPr/>
+        </p:nvSpPr>
+        <p:spPr>
+          <a:xfrm>
+            <a:off x="8591117" y="1690688"/>
+            <a:ext cx="673240" cy="492370"/>
+          </a:xfrm>
+          <a:prstGeom prst="rect">
+            <a:avLst/>
+          </a:prstGeom>
+          <a:solidFill>
+            <a:srgbClr val="85DFFF">
+              <a:alpha val="25098"/>
+            </a:srgbClr>
+          </a:solidFill>
+          <a:ln>
+            <a:noFill/>
+          </a:ln>
+        </p:spPr>
+        <p:style>
+          <a:lnRef idx="2">
+            <a:schemeClr val="accent1">
+              <a:shade val="50000"/>
+            </a:schemeClr>
+          </a:lnRef>
+          <a:fillRef idx="1">
+            <a:schemeClr val="accent1"/>
+          </a:fillRef>
+          <a:effectRef idx="0">
+            <a:schemeClr val="accent1"/>
+          </a:effectRef>
+          <a:fontRef idx="minor">
+            <a:schemeClr val="lt1"/>
+          </a:fontRef>
+        </p:style>
+        <p:txBody>
+          <a:bodyPr rtlCol="1" anchor="ctr"/>
+          <a:lstStyle/>
+          <a:p>
+            <a:pPr algn="ctr"/>
+            <a:endParaRPr lang="he-IL"/>
+          </a:p>
+        </p:txBody>
+      </p:sp>
+      <p:sp>
+        <p:nvSpPr>
+          <p:cNvPr id="8" name="מלבן 7">
+            <a:hlinkClick r:id="rId5" action="ppaction://hlinksldjump"/>
+            <a:extLst>
+              <a:ext uri="{FF2B5EF4-FFF2-40B4-BE49-F238E27FC236}">
+                <a16:creationId xmlns:a16="http://schemas.microsoft.com/office/drawing/2014/main" id="{7CCDE9A0-BC66-5301-9146-388931B59861}"/>
+              </a:ext>
+            </a:extLst>
+          </p:cNvPr>
+          <p:cNvSpPr/>
+          <p:nvPr/>
+        </p:nvSpPr>
+        <p:spPr>
+          <a:xfrm>
+            <a:off x="9264357" y="1690688"/>
+            <a:ext cx="964642" cy="492370"/>
+          </a:xfrm>
+          <a:prstGeom prst="rect">
+            <a:avLst/>
+          </a:prstGeom>
+          <a:solidFill>
+            <a:srgbClr val="85DFFF">
+              <a:alpha val="25098"/>
+            </a:srgbClr>
+          </a:solidFill>
+          <a:ln>
+            <a:noFill/>
+          </a:ln>
+        </p:spPr>
+        <p:style>
+          <a:lnRef idx="2">
+            <a:schemeClr val="accent1">
+              <a:shade val="50000"/>
+            </a:schemeClr>
+          </a:lnRef>
+          <a:fillRef idx="1">
+            <a:schemeClr val="accent1"/>
+          </a:fillRef>
+          <a:effectRef idx="0">
+            <a:schemeClr val="accent1"/>
+          </a:effectRef>
+          <a:fontRef idx="minor">
+            <a:schemeClr val="lt1"/>
+          </a:fontRef>
+        </p:style>
+        <p:txBody>
+          <a:bodyPr rtlCol="1" anchor="ctr"/>
+          <a:lstStyle/>
+          <a:p>
+            <a:pPr algn="ctr"/>
+            <a:endParaRPr lang="he-IL"/>
+          </a:p>
+        </p:txBody>
+      </p:sp>
+      <p:sp>
+        <p:nvSpPr>
+          <p:cNvPr id="9" name="מלבן 8">
+            <a:hlinkClick r:id="rId6" action="ppaction://hlinksldjump"/>
+            <a:extLst>
+              <a:ext uri="{FF2B5EF4-FFF2-40B4-BE49-F238E27FC236}">
+                <a16:creationId xmlns:a16="http://schemas.microsoft.com/office/drawing/2014/main" id="{C67A1FBD-02B1-1BEF-091B-228C6EF3D578}"/>
+              </a:ext>
+            </a:extLst>
+          </p:cNvPr>
+          <p:cNvSpPr/>
+          <p:nvPr/>
+        </p:nvSpPr>
+        <p:spPr>
+          <a:xfrm>
+            <a:off x="5322277" y="1690688"/>
+            <a:ext cx="560363" cy="492370"/>
+          </a:xfrm>
+          <a:prstGeom prst="rect">
+            <a:avLst/>
+          </a:prstGeom>
+          <a:solidFill>
+            <a:srgbClr val="85DFFF">
+              <a:alpha val="25098"/>
+            </a:srgbClr>
+          </a:solidFill>
+          <a:ln>
+            <a:noFill/>
+          </a:ln>
+        </p:spPr>
+        <p:style>
+          <a:lnRef idx="2">
+            <a:schemeClr val="accent1">
+              <a:shade val="50000"/>
+            </a:schemeClr>
+          </a:lnRef>
+          <a:fillRef idx="1">
+            <a:schemeClr val="accent1"/>
+          </a:fillRef>
+          <a:effectRef idx="0">
+            <a:schemeClr val="accent1"/>
+          </a:effectRef>
+          <a:fontRef idx="minor">
+            <a:schemeClr val="lt1"/>
+          </a:fontRef>
+        </p:style>
+        <p:txBody>
+          <a:bodyPr rtlCol="1" anchor="ctr"/>
+          <a:lstStyle/>
+          <a:p>
+            <a:pPr algn="ctr"/>
+            <a:endParaRPr lang="he-IL"/>
+          </a:p>
+        </p:txBody>
+      </p:sp>
+      <p:sp>
+        <p:nvSpPr>
+          <p:cNvPr id="10" name="מלבן 9">
+            <a:hlinkClick r:id="rId7" action="ppaction://hlinksldjump"/>
+            <a:extLst>
+              <a:ext uri="{FF2B5EF4-FFF2-40B4-BE49-F238E27FC236}">
+                <a16:creationId xmlns:a16="http://schemas.microsoft.com/office/drawing/2014/main" id="{05AE5E4A-0BD0-8711-E7A2-D9C8B880A450}"/>
+              </a:ext>
+            </a:extLst>
+          </p:cNvPr>
+          <p:cNvSpPr/>
+          <p:nvPr/>
+        </p:nvSpPr>
+        <p:spPr>
+          <a:xfrm>
+            <a:off x="2021840" y="1652728"/>
+            <a:ext cx="905803" cy="530330"/>
+          </a:xfrm>
+          <a:prstGeom prst="rect">
+            <a:avLst/>
+          </a:prstGeom>
+          <a:solidFill>
+            <a:srgbClr val="85DFFF">
+              <a:alpha val="25098"/>
+            </a:srgbClr>
+          </a:solidFill>
+          <a:ln>
+            <a:noFill/>
+          </a:ln>
+        </p:spPr>
+        <p:style>
+          <a:lnRef idx="2">
+            <a:schemeClr val="accent1">
+              <a:shade val="50000"/>
+            </a:schemeClr>
+          </a:lnRef>
+          <a:fillRef idx="1">
+            <a:schemeClr val="accent1"/>
+          </a:fillRef>
+          <a:effectRef idx="0">
+            <a:schemeClr val="accent1"/>
+          </a:effectRef>
+          <a:fontRef idx="minor">
+            <a:schemeClr val="lt1"/>
+          </a:fontRef>
+        </p:style>
+        <p:txBody>
+          <a:bodyPr rtlCol="1" anchor="ctr"/>
+          <a:lstStyle/>
+          <a:p>
+            <a:pPr algn="ctr"/>
+            <a:endParaRPr lang="he-IL"/>
+          </a:p>
+        </p:txBody>
+      </p:sp>
+      <p:sp>
+        <p:nvSpPr>
+          <p:cNvPr id="11" name="מלבן 10">
+            <a:hlinkClick r:id="rId5" action="ppaction://hlinksldjump"/>
+            <a:extLst>
+              <a:ext uri="{FF2B5EF4-FFF2-40B4-BE49-F238E27FC236}">
+                <a16:creationId xmlns:a16="http://schemas.microsoft.com/office/drawing/2014/main" id="{56550A93-00AB-21C8-B5FE-B521A38697F1}"/>
+              </a:ext>
+            </a:extLst>
+          </p:cNvPr>
+          <p:cNvSpPr/>
+          <p:nvPr/>
+        </p:nvSpPr>
+        <p:spPr>
+          <a:xfrm>
+            <a:off x="4347474" y="5409792"/>
+            <a:ext cx="4390126" cy="492370"/>
+          </a:xfrm>
+          <a:prstGeom prst="rect">
+            <a:avLst/>
+          </a:prstGeom>
+          <a:solidFill>
+            <a:srgbClr val="85DFFF">
+              <a:alpha val="25098"/>
+            </a:srgbClr>
+          </a:solidFill>
+          <a:ln>
+            <a:noFill/>
+          </a:ln>
+        </p:spPr>
+        <p:style>
+          <a:lnRef idx="2">
+            <a:schemeClr val="accent1">
+              <a:shade val="50000"/>
+            </a:schemeClr>
+          </a:lnRef>
+          <a:fillRef idx="1">
+            <a:schemeClr val="accent1"/>
+          </a:fillRef>
+          <a:effectRef idx="0">
+            <a:schemeClr val="accent1"/>
+          </a:effectRef>
+          <a:fontRef idx="minor">
+            <a:schemeClr val="lt1"/>
+          </a:fontRef>
+        </p:style>
+        <p:txBody>
+          <a:bodyPr rtlCol="1" anchor="ctr"/>
+          <a:lstStyle/>
+          <a:p>
+            <a:pPr algn="ctr"/>
+            <a:endParaRPr lang="he-IL"/>
+          </a:p>
+        </p:txBody>
+      </p:sp>
+      <p:sp>
+        <p:nvSpPr>
+          <p:cNvPr id="12" name="מלבן 11">
+            <a:hlinkClick r:id="rId8" action="ppaction://hlinksldjump"/>
+            <a:extLst>
+              <a:ext uri="{FF2B5EF4-FFF2-40B4-BE49-F238E27FC236}">
+                <a16:creationId xmlns:a16="http://schemas.microsoft.com/office/drawing/2014/main" id="{18EA8639-D2A5-65C3-8100-DDCAA6374D59}"/>
+              </a:ext>
+            </a:extLst>
+          </p:cNvPr>
+          <p:cNvSpPr/>
+          <p:nvPr/>
+        </p:nvSpPr>
+        <p:spPr>
+          <a:xfrm>
+            <a:off x="5322277" y="4849954"/>
+            <a:ext cx="1738923" cy="492370"/>
+          </a:xfrm>
+          <a:prstGeom prst="rect">
+            <a:avLst/>
+          </a:prstGeom>
+          <a:solidFill>
+            <a:srgbClr val="85DFFF">
+              <a:alpha val="25098"/>
+            </a:srgbClr>
+          </a:solidFill>
+          <a:ln>
+            <a:noFill/>
+          </a:ln>
+        </p:spPr>
+        <p:style>
+          <a:lnRef idx="2">
+            <a:schemeClr val="accent1">
+              <a:shade val="50000"/>
+            </a:schemeClr>
+          </a:lnRef>
+          <a:fillRef idx="1">
+            <a:schemeClr val="accent1"/>
+          </a:fillRef>
+          <a:effectRef idx="0">
+            <a:schemeClr val="accent1"/>
+          </a:effectRef>
+          <a:fontRef idx="minor">
+            <a:schemeClr val="lt1"/>
+          </a:fontRef>
+        </p:style>
+        <p:txBody>
+          <a:bodyPr rtlCol="1" anchor="ctr"/>
+          <a:lstStyle/>
+          <a:p>
+            <a:pPr algn="ctr"/>
+            <a:endParaRPr lang="he-IL"/>
+          </a:p>
+        </p:txBody>
+      </p:sp>
     </p:spTree>
     <p:extLst>
       <p:ext uri="{BB962C8B-B14F-4D97-AF65-F5344CB8AC3E}">
@@ -4100,11 +5478,370 @@
         </p:blipFill>
         <p:spPr>
           <a:xfrm>
-            <a:off x="1678600" y="1825625"/>
+            <a:off x="1678600" y="2141537"/>
             <a:ext cx="8834800" cy="4351338"/>
           </a:xfrm>
         </p:spPr>
       </p:pic>
+      <p:pic>
+        <p:nvPicPr>
+          <p:cNvPr id="6" name="מציין מיקום תוכן 6">
+            <a:extLst>
+              <a:ext uri="{FF2B5EF4-FFF2-40B4-BE49-F238E27FC236}">
+                <a16:creationId xmlns:a16="http://schemas.microsoft.com/office/drawing/2014/main" id="{B97645B1-760A-35F2-A591-BD756131E9DF}"/>
+              </a:ext>
+            </a:extLst>
+          </p:cNvPr>
+          <p:cNvPicPr>
+            <a:picLocks noChangeAspect="1"/>
+          </p:cNvPicPr>
+          <p:nvPr/>
+        </p:nvPicPr>
+        <p:blipFill rotWithShape="1">
+          <a:blip r:embed="rId3"/>
+          <a:srcRect b="80309"/>
+          <a:stretch/>
+        </p:blipFill>
+        <p:spPr>
+          <a:xfrm>
+            <a:off x="1597689" y="1343818"/>
+            <a:ext cx="8915710" cy="856823"/>
+          </a:xfrm>
+          <a:prstGeom prst="rect">
+            <a:avLst/>
+          </a:prstGeom>
+        </p:spPr>
+      </p:pic>
+      <p:sp>
+        <p:nvSpPr>
+          <p:cNvPr id="7" name="מלבן 6">
+            <a:hlinkClick r:id="rId4" action="ppaction://hlinksldjump"/>
+            <a:extLst>
+              <a:ext uri="{FF2B5EF4-FFF2-40B4-BE49-F238E27FC236}">
+                <a16:creationId xmlns:a16="http://schemas.microsoft.com/office/drawing/2014/main" id="{3689E6E4-6D48-9C9C-98D4-D7D159D12A1E}"/>
+              </a:ext>
+            </a:extLst>
+          </p:cNvPr>
+          <p:cNvSpPr/>
+          <p:nvPr/>
+        </p:nvSpPr>
+        <p:spPr>
+          <a:xfrm>
+            <a:off x="8560637" y="1552470"/>
+            <a:ext cx="673240" cy="492370"/>
+          </a:xfrm>
+          <a:prstGeom prst="rect">
+            <a:avLst/>
+          </a:prstGeom>
+          <a:solidFill>
+            <a:srgbClr val="85DFFF">
+              <a:alpha val="25098"/>
+            </a:srgbClr>
+          </a:solidFill>
+          <a:ln>
+            <a:noFill/>
+          </a:ln>
+        </p:spPr>
+        <p:style>
+          <a:lnRef idx="2">
+            <a:schemeClr val="accent1">
+              <a:shade val="50000"/>
+            </a:schemeClr>
+          </a:lnRef>
+          <a:fillRef idx="1">
+            <a:schemeClr val="accent1"/>
+          </a:fillRef>
+          <a:effectRef idx="0">
+            <a:schemeClr val="accent1"/>
+          </a:effectRef>
+          <a:fontRef idx="minor">
+            <a:schemeClr val="lt1"/>
+          </a:fontRef>
+        </p:style>
+        <p:txBody>
+          <a:bodyPr rtlCol="1" anchor="ctr"/>
+          <a:lstStyle/>
+          <a:p>
+            <a:pPr algn="ctr"/>
+            <a:endParaRPr lang="he-IL"/>
+          </a:p>
+        </p:txBody>
+      </p:sp>
+      <p:sp>
+        <p:nvSpPr>
+          <p:cNvPr id="8" name="מלבן 7">
+            <a:hlinkClick r:id="rId5" action="ppaction://hlinksldjump"/>
+            <a:extLst>
+              <a:ext uri="{FF2B5EF4-FFF2-40B4-BE49-F238E27FC236}">
+                <a16:creationId xmlns:a16="http://schemas.microsoft.com/office/drawing/2014/main" id="{BEAE5B66-15F1-07EE-A14D-E3E9EE926902}"/>
+              </a:ext>
+            </a:extLst>
+          </p:cNvPr>
+          <p:cNvSpPr/>
+          <p:nvPr/>
+        </p:nvSpPr>
+        <p:spPr>
+          <a:xfrm>
+            <a:off x="9233877" y="1552470"/>
+            <a:ext cx="964642" cy="492370"/>
+          </a:xfrm>
+          <a:prstGeom prst="rect">
+            <a:avLst/>
+          </a:prstGeom>
+          <a:solidFill>
+            <a:srgbClr val="85DFFF">
+              <a:alpha val="25098"/>
+            </a:srgbClr>
+          </a:solidFill>
+          <a:ln>
+            <a:noFill/>
+          </a:ln>
+        </p:spPr>
+        <p:style>
+          <a:lnRef idx="2">
+            <a:schemeClr val="accent1">
+              <a:shade val="50000"/>
+            </a:schemeClr>
+          </a:lnRef>
+          <a:fillRef idx="1">
+            <a:schemeClr val="accent1"/>
+          </a:fillRef>
+          <a:effectRef idx="0">
+            <a:schemeClr val="accent1"/>
+          </a:effectRef>
+          <a:fontRef idx="minor">
+            <a:schemeClr val="lt1"/>
+          </a:fontRef>
+        </p:style>
+        <p:txBody>
+          <a:bodyPr rtlCol="1" anchor="ctr"/>
+          <a:lstStyle/>
+          <a:p>
+            <a:pPr algn="ctr"/>
+            <a:endParaRPr lang="he-IL"/>
+          </a:p>
+        </p:txBody>
+      </p:sp>
+      <p:sp>
+        <p:nvSpPr>
+          <p:cNvPr id="9" name="מלבן 8">
+            <a:hlinkClick r:id="rId6" action="ppaction://hlinksldjump"/>
+            <a:extLst>
+              <a:ext uri="{FF2B5EF4-FFF2-40B4-BE49-F238E27FC236}">
+                <a16:creationId xmlns:a16="http://schemas.microsoft.com/office/drawing/2014/main" id="{7649FD34-72A7-5B21-33C7-51E78A37129F}"/>
+              </a:ext>
+            </a:extLst>
+          </p:cNvPr>
+          <p:cNvSpPr/>
+          <p:nvPr/>
+        </p:nvSpPr>
+        <p:spPr>
+          <a:xfrm>
+            <a:off x="5291797" y="1552470"/>
+            <a:ext cx="560363" cy="492370"/>
+          </a:xfrm>
+          <a:prstGeom prst="rect">
+            <a:avLst/>
+          </a:prstGeom>
+          <a:solidFill>
+            <a:srgbClr val="85DFFF">
+              <a:alpha val="25098"/>
+            </a:srgbClr>
+          </a:solidFill>
+          <a:ln>
+            <a:noFill/>
+          </a:ln>
+        </p:spPr>
+        <p:style>
+          <a:lnRef idx="2">
+            <a:schemeClr val="accent1">
+              <a:shade val="50000"/>
+            </a:schemeClr>
+          </a:lnRef>
+          <a:fillRef idx="1">
+            <a:schemeClr val="accent1"/>
+          </a:fillRef>
+          <a:effectRef idx="0">
+            <a:schemeClr val="accent1"/>
+          </a:effectRef>
+          <a:fontRef idx="minor">
+            <a:schemeClr val="lt1"/>
+          </a:fontRef>
+        </p:style>
+        <p:txBody>
+          <a:bodyPr rtlCol="1" anchor="ctr"/>
+          <a:lstStyle/>
+          <a:p>
+            <a:pPr algn="ctr"/>
+            <a:endParaRPr lang="he-IL"/>
+          </a:p>
+        </p:txBody>
+      </p:sp>
+      <p:sp>
+        <p:nvSpPr>
+          <p:cNvPr id="11" name="מלבן 10">
+            <a:hlinkClick r:id="rId7" action="ppaction://hlinksldjump"/>
+            <a:extLst>
+              <a:ext uri="{FF2B5EF4-FFF2-40B4-BE49-F238E27FC236}">
+                <a16:creationId xmlns:a16="http://schemas.microsoft.com/office/drawing/2014/main" id="{213938C3-E3F6-85A1-3460-C0AC690DDD4B}"/>
+              </a:ext>
+            </a:extLst>
+          </p:cNvPr>
+          <p:cNvSpPr/>
+          <p:nvPr/>
+        </p:nvSpPr>
+        <p:spPr>
+          <a:xfrm>
+            <a:off x="1898357" y="1578871"/>
+            <a:ext cx="905803" cy="530330"/>
+          </a:xfrm>
+          <a:prstGeom prst="rect">
+            <a:avLst/>
+          </a:prstGeom>
+          <a:solidFill>
+            <a:srgbClr val="85DFFF">
+              <a:alpha val="25098"/>
+            </a:srgbClr>
+          </a:solidFill>
+          <a:ln>
+            <a:noFill/>
+          </a:ln>
+        </p:spPr>
+        <p:style>
+          <a:lnRef idx="2">
+            <a:schemeClr val="accent1">
+              <a:shade val="50000"/>
+            </a:schemeClr>
+          </a:lnRef>
+          <a:fillRef idx="1">
+            <a:schemeClr val="accent1"/>
+          </a:fillRef>
+          <a:effectRef idx="0">
+            <a:schemeClr val="accent1"/>
+          </a:effectRef>
+          <a:fontRef idx="minor">
+            <a:schemeClr val="lt1"/>
+          </a:fontRef>
+        </p:style>
+        <p:txBody>
+          <a:bodyPr rtlCol="1" anchor="ctr"/>
+          <a:lstStyle/>
+          <a:p>
+            <a:pPr algn="ctr"/>
+            <a:endParaRPr lang="he-IL"/>
+          </a:p>
+        </p:txBody>
+      </p:sp>
+      <p:sp>
+        <p:nvSpPr>
+          <p:cNvPr id="12" name="מלבן 11">
+            <a:hlinkClick r:id="rId4" action="ppaction://hlinksldjump"/>
+            <a:extLst>
+              <a:ext uri="{FF2B5EF4-FFF2-40B4-BE49-F238E27FC236}">
+                <a16:creationId xmlns:a16="http://schemas.microsoft.com/office/drawing/2014/main" id="{F8BFFD1B-F2CB-EC92-FE40-2AC653CE3262}"/>
+              </a:ext>
+            </a:extLst>
+          </p:cNvPr>
+          <p:cNvSpPr/>
+          <p:nvPr/>
+        </p:nvSpPr>
+        <p:spPr>
+          <a:xfrm>
+            <a:off x="4347474" y="5846672"/>
+            <a:ext cx="4390126" cy="492370"/>
+          </a:xfrm>
+          <a:prstGeom prst="rect">
+            <a:avLst/>
+          </a:prstGeom>
+          <a:solidFill>
+            <a:srgbClr val="85DFFF">
+              <a:alpha val="25098"/>
+            </a:srgbClr>
+          </a:solidFill>
+          <a:ln>
+            <a:noFill/>
+          </a:ln>
+        </p:spPr>
+        <p:style>
+          <a:lnRef idx="2">
+            <a:schemeClr val="accent1">
+              <a:shade val="50000"/>
+            </a:schemeClr>
+          </a:lnRef>
+          <a:fillRef idx="1">
+            <a:schemeClr val="accent1"/>
+          </a:fillRef>
+          <a:effectRef idx="0">
+            <a:schemeClr val="accent1"/>
+          </a:effectRef>
+          <a:fontRef idx="minor">
+            <a:schemeClr val="lt1"/>
+          </a:fontRef>
+        </p:style>
+        <p:txBody>
+          <a:bodyPr rtlCol="1" anchor="ctr"/>
+          <a:lstStyle/>
+          <a:p>
+            <a:pPr algn="ctr"/>
+            <a:endParaRPr lang="he-IL"/>
+          </a:p>
+        </p:txBody>
+      </p:sp>
+      <p:sp>
+        <p:nvSpPr>
+          <p:cNvPr id="13" name="מלבן 12">
+            <a:hlinkClick r:id="rId8" action="ppaction://hlinksldjump"/>
+            <a:extLst>
+              <a:ext uri="{FF2B5EF4-FFF2-40B4-BE49-F238E27FC236}">
+                <a16:creationId xmlns:a16="http://schemas.microsoft.com/office/drawing/2014/main" id="{75E80718-0BA1-B214-5725-BF670C7E5A94}"/>
+              </a:ext>
+            </a:extLst>
+          </p:cNvPr>
+          <p:cNvSpPr/>
+          <p:nvPr/>
+        </p:nvSpPr>
+        <p:spPr>
+          <a:xfrm>
+            <a:off x="5129794" y="5198501"/>
+            <a:ext cx="1982206" cy="492370"/>
+          </a:xfrm>
+          <a:prstGeom prst="rect">
+            <a:avLst/>
+          </a:prstGeom>
+          <a:solidFill>
+            <a:srgbClr val="85DFFF">
+              <a:alpha val="25098"/>
+            </a:srgbClr>
+          </a:solidFill>
+          <a:ln>
+            <a:noFill/>
+          </a:ln>
+        </p:spPr>
+        <p:style>
+          <a:lnRef idx="2">
+            <a:schemeClr val="accent1">
+              <a:shade val="50000"/>
+            </a:schemeClr>
+          </a:lnRef>
+          <a:fillRef idx="1">
+            <a:schemeClr val="accent1"/>
+          </a:fillRef>
+          <a:effectRef idx="0">
+            <a:schemeClr val="accent1"/>
+          </a:effectRef>
+          <a:fontRef idx="minor">
+            <a:schemeClr val="lt1"/>
+          </a:fontRef>
+        </p:style>
+        <p:txBody>
+          <a:bodyPr rtlCol="1" anchor="ctr"/>
+          <a:lstStyle/>
+          <a:p>
+            <a:pPr algn="ctr"/>
+            <a:endParaRPr lang="he-IL"/>
+          </a:p>
+        </p:txBody>
+      </p:sp>
     </p:spTree>
     <p:extLst>
       <p:ext uri="{BB962C8B-B14F-4D97-AF65-F5344CB8AC3E}">
@@ -4194,6 +5931,281 @@
           </a:xfrm>
         </p:spPr>
       </p:pic>
+      <p:sp>
+        <p:nvSpPr>
+          <p:cNvPr id="8" name="מלבן 7">
+            <a:hlinkClick r:id="rId3" action="ppaction://hlinksldjump"/>
+            <a:extLst>
+              <a:ext uri="{FF2B5EF4-FFF2-40B4-BE49-F238E27FC236}">
+                <a16:creationId xmlns:a16="http://schemas.microsoft.com/office/drawing/2014/main" id="{F82B3363-8FAA-2736-A012-54BF7A18C92B}"/>
+              </a:ext>
+            </a:extLst>
+          </p:cNvPr>
+          <p:cNvSpPr/>
+          <p:nvPr/>
+        </p:nvSpPr>
+        <p:spPr>
+          <a:xfrm>
+            <a:off x="5342597" y="2009670"/>
+            <a:ext cx="560363" cy="492370"/>
+          </a:xfrm>
+          <a:prstGeom prst="rect">
+            <a:avLst/>
+          </a:prstGeom>
+          <a:solidFill>
+            <a:srgbClr val="85DFFF">
+              <a:alpha val="25098"/>
+            </a:srgbClr>
+          </a:solidFill>
+          <a:ln>
+            <a:noFill/>
+          </a:ln>
+        </p:spPr>
+        <p:style>
+          <a:lnRef idx="2">
+            <a:schemeClr val="accent1">
+              <a:shade val="50000"/>
+            </a:schemeClr>
+          </a:lnRef>
+          <a:fillRef idx="1">
+            <a:schemeClr val="accent1"/>
+          </a:fillRef>
+          <a:effectRef idx="0">
+            <a:schemeClr val="accent1"/>
+          </a:effectRef>
+          <a:fontRef idx="minor">
+            <a:schemeClr val="lt1"/>
+          </a:fontRef>
+        </p:style>
+        <p:txBody>
+          <a:bodyPr rtlCol="1" anchor="ctr"/>
+          <a:lstStyle/>
+          <a:p>
+            <a:pPr algn="ctr"/>
+            <a:endParaRPr lang="he-IL"/>
+          </a:p>
+        </p:txBody>
+      </p:sp>
+      <p:sp>
+        <p:nvSpPr>
+          <p:cNvPr id="9" name="מלבן 8">
+            <a:hlinkClick r:id="rId4" action="ppaction://hlinksldjump"/>
+            <a:extLst>
+              <a:ext uri="{FF2B5EF4-FFF2-40B4-BE49-F238E27FC236}">
+                <a16:creationId xmlns:a16="http://schemas.microsoft.com/office/drawing/2014/main" id="{77CFD161-EFAD-C763-550A-3D967F2FBD8B}"/>
+              </a:ext>
+            </a:extLst>
+          </p:cNvPr>
+          <p:cNvSpPr/>
+          <p:nvPr/>
+        </p:nvSpPr>
+        <p:spPr>
+          <a:xfrm>
+            <a:off x="2030437" y="2019830"/>
+            <a:ext cx="905803" cy="530330"/>
+          </a:xfrm>
+          <a:prstGeom prst="rect">
+            <a:avLst/>
+          </a:prstGeom>
+          <a:solidFill>
+            <a:srgbClr val="85DFFF">
+              <a:alpha val="25098"/>
+            </a:srgbClr>
+          </a:solidFill>
+          <a:ln>
+            <a:noFill/>
+          </a:ln>
+        </p:spPr>
+        <p:style>
+          <a:lnRef idx="2">
+            <a:schemeClr val="accent1">
+              <a:shade val="50000"/>
+            </a:schemeClr>
+          </a:lnRef>
+          <a:fillRef idx="1">
+            <a:schemeClr val="accent1"/>
+          </a:fillRef>
+          <a:effectRef idx="0">
+            <a:schemeClr val="accent1"/>
+          </a:effectRef>
+          <a:fontRef idx="minor">
+            <a:schemeClr val="lt1"/>
+          </a:fontRef>
+        </p:style>
+        <p:txBody>
+          <a:bodyPr rtlCol="1" anchor="ctr"/>
+          <a:lstStyle/>
+          <a:p>
+            <a:pPr algn="ctr"/>
+            <a:endParaRPr lang="he-IL"/>
+          </a:p>
+        </p:txBody>
+      </p:sp>
+      <p:sp>
+        <p:nvSpPr>
+          <p:cNvPr id="10" name="מלבן 9">
+            <a:hlinkClick r:id="rId5" action="ppaction://hlinksldjump"/>
+            <a:extLst>
+              <a:ext uri="{FF2B5EF4-FFF2-40B4-BE49-F238E27FC236}">
+                <a16:creationId xmlns:a16="http://schemas.microsoft.com/office/drawing/2014/main" id="{EC5CD784-8FF0-436C-3C86-5DFF8D759CD1}"/>
+              </a:ext>
+            </a:extLst>
+          </p:cNvPr>
+          <p:cNvSpPr/>
+          <p:nvPr/>
+        </p:nvSpPr>
+        <p:spPr>
+          <a:xfrm>
+            <a:off x="8898597" y="2274835"/>
+            <a:ext cx="905803" cy="492370"/>
+          </a:xfrm>
+          <a:prstGeom prst="rect">
+            <a:avLst/>
+          </a:prstGeom>
+          <a:solidFill>
+            <a:srgbClr val="85DFFF">
+              <a:alpha val="25098"/>
+            </a:srgbClr>
+          </a:solidFill>
+          <a:ln>
+            <a:noFill/>
+          </a:ln>
+        </p:spPr>
+        <p:style>
+          <a:lnRef idx="2">
+            <a:schemeClr val="accent1">
+              <a:shade val="50000"/>
+            </a:schemeClr>
+          </a:lnRef>
+          <a:fillRef idx="1">
+            <a:schemeClr val="accent1"/>
+          </a:fillRef>
+          <a:effectRef idx="0">
+            <a:schemeClr val="accent1"/>
+          </a:effectRef>
+          <a:fontRef idx="minor">
+            <a:schemeClr val="lt1"/>
+          </a:fontRef>
+        </p:style>
+        <p:txBody>
+          <a:bodyPr rtlCol="1" anchor="ctr"/>
+          <a:lstStyle/>
+          <a:p>
+            <a:pPr algn="ctr"/>
+            <a:endParaRPr lang="he-IL"/>
+          </a:p>
+        </p:txBody>
+      </p:sp>
+      <p:sp>
+        <p:nvSpPr>
+          <p:cNvPr id="11" name="מלבן 10">
+            <a:hlinkClick r:id="rId6" action="ppaction://hlinksldjump"/>
+            <a:extLst>
+              <a:ext uri="{FF2B5EF4-FFF2-40B4-BE49-F238E27FC236}">
+                <a16:creationId xmlns:a16="http://schemas.microsoft.com/office/drawing/2014/main" id="{56264373-6F15-C5E5-70A4-F06682C48F05}"/>
+              </a:ext>
+            </a:extLst>
+          </p:cNvPr>
+          <p:cNvSpPr/>
+          <p:nvPr/>
+        </p:nvSpPr>
+        <p:spPr>
+          <a:xfrm>
+            <a:off x="8990037" y="4206919"/>
+            <a:ext cx="1058203" cy="354921"/>
+          </a:xfrm>
+          <a:prstGeom prst="rect">
+            <a:avLst/>
+          </a:prstGeom>
+          <a:solidFill>
+            <a:srgbClr val="85DFFF">
+              <a:alpha val="25098"/>
+            </a:srgbClr>
+          </a:solidFill>
+          <a:ln>
+            <a:noFill/>
+          </a:ln>
+        </p:spPr>
+        <p:style>
+          <a:lnRef idx="2">
+            <a:schemeClr val="accent1">
+              <a:shade val="50000"/>
+            </a:schemeClr>
+          </a:lnRef>
+          <a:fillRef idx="1">
+            <a:schemeClr val="accent1"/>
+          </a:fillRef>
+          <a:effectRef idx="0">
+            <a:schemeClr val="accent1"/>
+          </a:effectRef>
+          <a:fontRef idx="minor">
+            <a:schemeClr val="lt1"/>
+          </a:fontRef>
+        </p:style>
+        <p:txBody>
+          <a:bodyPr rtlCol="1" anchor="ctr"/>
+          <a:lstStyle/>
+          <a:p>
+            <a:pPr algn="ctr"/>
+            <a:endParaRPr lang="he-IL"/>
+          </a:p>
+        </p:txBody>
+      </p:sp>
+      <p:sp>
+        <p:nvSpPr>
+          <p:cNvPr id="12" name="מלבן 11">
+            <a:hlinkClick r:id="rId7" action="ppaction://hlinksldjump"/>
+            <a:extLst>
+              <a:ext uri="{FF2B5EF4-FFF2-40B4-BE49-F238E27FC236}">
+                <a16:creationId xmlns:a16="http://schemas.microsoft.com/office/drawing/2014/main" id="{54E70263-00F5-8344-D167-0C08A554EE1B}"/>
+              </a:ext>
+            </a:extLst>
+          </p:cNvPr>
+          <p:cNvSpPr/>
+          <p:nvPr/>
+        </p:nvSpPr>
+        <p:spPr>
+          <a:xfrm>
+            <a:off x="9152597" y="3717061"/>
+            <a:ext cx="1058203" cy="354921"/>
+          </a:xfrm>
+          <a:prstGeom prst="rect">
+            <a:avLst/>
+          </a:prstGeom>
+          <a:solidFill>
+            <a:srgbClr val="85DFFF">
+              <a:alpha val="25098"/>
+            </a:srgbClr>
+          </a:solidFill>
+          <a:ln>
+            <a:noFill/>
+          </a:ln>
+        </p:spPr>
+        <p:style>
+          <a:lnRef idx="2">
+            <a:schemeClr val="accent1">
+              <a:shade val="50000"/>
+            </a:schemeClr>
+          </a:lnRef>
+          <a:fillRef idx="1">
+            <a:schemeClr val="accent1"/>
+          </a:fillRef>
+          <a:effectRef idx="0">
+            <a:schemeClr val="accent1"/>
+          </a:effectRef>
+          <a:fontRef idx="minor">
+            <a:schemeClr val="lt1"/>
+          </a:fontRef>
+        </p:style>
+        <p:txBody>
+          <a:bodyPr rtlCol="1" anchor="ctr"/>
+          <a:lstStyle/>
+          <a:p>
+            <a:pPr algn="ctr"/>
+            <a:endParaRPr lang="he-IL"/>
+          </a:p>
+        </p:txBody>
+      </p:sp>
     </p:spTree>
     <p:extLst>
       <p:ext uri="{BB962C8B-B14F-4D97-AF65-F5344CB8AC3E}">
@@ -4283,6 +6295,116 @@
           </a:xfrm>
         </p:spPr>
       </p:pic>
+      <p:sp>
+        <p:nvSpPr>
+          <p:cNvPr id="6" name="מלבן 5">
+            <a:hlinkClick r:id="rId3" action="ppaction://hlinksldjump"/>
+            <a:extLst>
+              <a:ext uri="{FF2B5EF4-FFF2-40B4-BE49-F238E27FC236}">
+                <a16:creationId xmlns:a16="http://schemas.microsoft.com/office/drawing/2014/main" id="{F5DD3006-B626-F36E-91DC-51D9B9980611}"/>
+              </a:ext>
+            </a:extLst>
+          </p:cNvPr>
+          <p:cNvSpPr/>
+          <p:nvPr/>
+        </p:nvSpPr>
+        <p:spPr>
+          <a:xfrm>
+            <a:off x="2030437" y="2019830"/>
+            <a:ext cx="905803" cy="530330"/>
+          </a:xfrm>
+          <a:prstGeom prst="rect">
+            <a:avLst/>
+          </a:prstGeom>
+          <a:solidFill>
+            <a:srgbClr val="85DFFF">
+              <a:alpha val="25098"/>
+            </a:srgbClr>
+          </a:solidFill>
+          <a:ln>
+            <a:noFill/>
+          </a:ln>
+        </p:spPr>
+        <p:style>
+          <a:lnRef idx="2">
+            <a:schemeClr val="accent1">
+              <a:shade val="50000"/>
+            </a:schemeClr>
+          </a:lnRef>
+          <a:fillRef idx="1">
+            <a:schemeClr val="accent1"/>
+          </a:fillRef>
+          <a:effectRef idx="0">
+            <a:schemeClr val="accent1"/>
+          </a:effectRef>
+          <a:fontRef idx="minor">
+            <a:schemeClr val="lt1"/>
+          </a:fontRef>
+        </p:style>
+        <p:txBody>
+          <a:bodyPr rtlCol="1" anchor="ctr"/>
+          <a:lstStyle/>
+          <a:p>
+            <a:pPr algn="ctr"/>
+            <a:endParaRPr lang="he-IL"/>
+          </a:p>
+        </p:txBody>
+      </p:sp>
+      <p:sp>
+        <p:nvSpPr>
+          <p:cNvPr id="7" name="מלבן 6">
+            <a:hlinkClick r:id="rId3" action="ppaction://hlinksldjump"/>
+            <a:extLst>
+              <a:ext uri="{FF2B5EF4-FFF2-40B4-BE49-F238E27FC236}">
+                <a16:creationId xmlns:a16="http://schemas.microsoft.com/office/drawing/2014/main" id="{0F527957-CA70-05A3-AC83-B985795893CE}"/>
+              </a:ext>
+            </a:extLst>
+          </p:cNvPr>
+          <p:cNvSpPr/>
+          <p:nvPr/>
+        </p:nvSpPr>
+        <p:spPr>
+          <a:xfrm>
+            <a:off x="5271477" y="4600470"/>
+            <a:ext cx="997243" cy="408410"/>
+          </a:xfrm>
+          <a:prstGeom prst="rect">
+            <a:avLst/>
+          </a:prstGeom>
+          <a:solidFill>
+            <a:srgbClr val="85DFFF">
+              <a:alpha val="25098"/>
+            </a:srgbClr>
+          </a:solidFill>
+          <a:ln>
+            <a:noFill/>
+          </a:ln>
+        </p:spPr>
+        <p:style>
+          <a:lnRef idx="2">
+            <a:schemeClr val="accent1">
+              <a:shade val="50000"/>
+            </a:schemeClr>
+          </a:lnRef>
+          <a:fillRef idx="1">
+            <a:schemeClr val="accent1"/>
+          </a:fillRef>
+          <a:effectRef idx="0">
+            <a:schemeClr val="accent1"/>
+          </a:effectRef>
+          <a:fontRef idx="minor">
+            <a:schemeClr val="lt1"/>
+          </a:fontRef>
+        </p:style>
+        <p:txBody>
+          <a:bodyPr rtlCol="1" anchor="ctr"/>
+          <a:lstStyle/>
+          <a:p>
+            <a:pPr algn="ctr"/>
+            <a:endParaRPr lang="he-IL"/>
+          </a:p>
+        </p:txBody>
+      </p:sp>
     </p:spTree>
     <p:extLst>
       <p:ext uri="{BB962C8B-B14F-4D97-AF65-F5344CB8AC3E}">
@@ -4372,6 +6494,171 @@
           </a:xfrm>
         </p:spPr>
       </p:pic>
+      <p:sp>
+        <p:nvSpPr>
+          <p:cNvPr id="8" name="מלבן 7">
+            <a:hlinkClick r:id="rId3" action="ppaction://hlinksldjump"/>
+            <a:extLst>
+              <a:ext uri="{FF2B5EF4-FFF2-40B4-BE49-F238E27FC236}">
+                <a16:creationId xmlns:a16="http://schemas.microsoft.com/office/drawing/2014/main" id="{DB9E04C3-C65B-C941-1DD9-7C5FC31D7928}"/>
+              </a:ext>
+            </a:extLst>
+          </p:cNvPr>
+          <p:cNvSpPr/>
+          <p:nvPr/>
+        </p:nvSpPr>
+        <p:spPr>
+          <a:xfrm>
+            <a:off x="2030437" y="2019830"/>
+            <a:ext cx="905803" cy="530330"/>
+          </a:xfrm>
+          <a:prstGeom prst="rect">
+            <a:avLst/>
+          </a:prstGeom>
+          <a:solidFill>
+            <a:srgbClr val="85DFFF">
+              <a:alpha val="25098"/>
+            </a:srgbClr>
+          </a:solidFill>
+          <a:ln>
+            <a:noFill/>
+          </a:ln>
+        </p:spPr>
+        <p:style>
+          <a:lnRef idx="2">
+            <a:schemeClr val="accent1">
+              <a:shade val="50000"/>
+            </a:schemeClr>
+          </a:lnRef>
+          <a:fillRef idx="1">
+            <a:schemeClr val="accent1"/>
+          </a:fillRef>
+          <a:effectRef idx="0">
+            <a:schemeClr val="accent1"/>
+          </a:effectRef>
+          <a:fontRef idx="minor">
+            <a:schemeClr val="lt1"/>
+          </a:fontRef>
+        </p:style>
+        <p:txBody>
+          <a:bodyPr rtlCol="1" anchor="ctr"/>
+          <a:lstStyle/>
+          <a:p>
+            <a:pPr algn="ctr"/>
+            <a:endParaRPr lang="he-IL"/>
+          </a:p>
+        </p:txBody>
+      </p:sp>
+      <p:sp>
+        <p:nvSpPr>
+          <p:cNvPr id="9" name="מלבן 8">
+            <a:hlinkClick r:id="rId4" action="ppaction://hlinksldjump"/>
+            <a:extLst>
+              <a:ext uri="{FF2B5EF4-FFF2-40B4-BE49-F238E27FC236}">
+                <a16:creationId xmlns:a16="http://schemas.microsoft.com/office/drawing/2014/main" id="{FFCB388B-18D0-6061-0CE1-F251CF983987}"/>
+              </a:ext>
+            </a:extLst>
+          </p:cNvPr>
+          <p:cNvSpPr/>
+          <p:nvPr/>
+        </p:nvSpPr>
+        <p:spPr>
+          <a:xfrm>
+            <a:off x="8270240" y="5310328"/>
+            <a:ext cx="905803" cy="530330"/>
+          </a:xfrm>
+          <a:prstGeom prst="rect">
+            <a:avLst/>
+          </a:prstGeom>
+          <a:solidFill>
+            <a:srgbClr val="85DFFF">
+              <a:alpha val="25098"/>
+            </a:srgbClr>
+          </a:solidFill>
+          <a:ln>
+            <a:noFill/>
+          </a:ln>
+        </p:spPr>
+        <p:style>
+          <a:lnRef idx="2">
+            <a:schemeClr val="accent1">
+              <a:shade val="50000"/>
+            </a:schemeClr>
+          </a:lnRef>
+          <a:fillRef idx="1">
+            <a:schemeClr val="accent1"/>
+          </a:fillRef>
+          <a:effectRef idx="0">
+            <a:schemeClr val="accent1"/>
+          </a:effectRef>
+          <a:fontRef idx="minor">
+            <a:schemeClr val="lt1"/>
+          </a:fontRef>
+        </p:style>
+        <p:txBody>
+          <a:bodyPr rtlCol="1" anchor="ctr"/>
+          <a:lstStyle/>
+          <a:p>
+            <a:pPr algn="ctr"/>
+            <a:endParaRPr lang="he-IL"/>
+          </a:p>
+        </p:txBody>
+      </p:sp>
+      <p:sp>
+        <p:nvSpPr>
+          <p:cNvPr id="10" name="מלבן 9">
+            <a:hlinkClick r:id="rId5" action="ppaction://hlinksldjump"/>
+            <a:extLst>
+              <a:ext uri="{FF2B5EF4-FFF2-40B4-BE49-F238E27FC236}">
+                <a16:creationId xmlns:a16="http://schemas.microsoft.com/office/drawing/2014/main" id="{F15BBFC3-1AF7-BEAE-BFAC-B0CB1B8C83A7}"/>
+              </a:ext>
+            </a:extLst>
+          </p:cNvPr>
+          <p:cNvSpPr/>
+          <p:nvPr/>
+        </p:nvSpPr>
+        <p:spPr>
+          <a:xfrm>
+            <a:off x="8910320" y="3302812"/>
+            <a:ext cx="458763" cy="273508"/>
+          </a:xfrm>
+          <a:prstGeom prst="rect">
+            <a:avLst/>
+          </a:prstGeom>
+          <a:solidFill>
+            <a:srgbClr val="85DFFF">
+              <a:alpha val="25098"/>
+            </a:srgbClr>
+          </a:solidFill>
+          <a:ln>
+            <a:noFill/>
+          </a:ln>
+        </p:spPr>
+        <p:style>
+          <a:lnRef idx="2">
+            <a:schemeClr val="accent1">
+              <a:shade val="50000"/>
+            </a:schemeClr>
+          </a:lnRef>
+          <a:fillRef idx="1">
+            <a:schemeClr val="accent1"/>
+          </a:fillRef>
+          <a:effectRef idx="0">
+            <a:schemeClr val="accent1"/>
+          </a:effectRef>
+          <a:fontRef idx="minor">
+            <a:schemeClr val="lt1"/>
+          </a:fontRef>
+        </p:style>
+        <p:txBody>
+          <a:bodyPr rtlCol="1" anchor="ctr"/>
+          <a:lstStyle/>
+          <a:p>
+            <a:pPr algn="ctr"/>
+            <a:endParaRPr lang="he-IL"/>
+          </a:p>
+        </p:txBody>
+      </p:sp>
     </p:spTree>
     <p:extLst>
       <p:ext uri="{BB962C8B-B14F-4D97-AF65-F5344CB8AC3E}">
@@ -4465,6 +6752,171 @@
           </a:xfrm>
         </p:spPr>
       </p:pic>
+      <p:sp>
+        <p:nvSpPr>
+          <p:cNvPr id="6" name="מלבן 5">
+            <a:hlinkClick r:id="rId3" action="ppaction://hlinksldjump"/>
+            <a:extLst>
+              <a:ext uri="{FF2B5EF4-FFF2-40B4-BE49-F238E27FC236}">
+                <a16:creationId xmlns:a16="http://schemas.microsoft.com/office/drawing/2014/main" id="{3237C41F-AF14-494A-1580-0659C650DB31}"/>
+              </a:ext>
+            </a:extLst>
+          </p:cNvPr>
+          <p:cNvSpPr/>
+          <p:nvPr/>
+        </p:nvSpPr>
+        <p:spPr>
+          <a:xfrm>
+            <a:off x="2030437" y="2019830"/>
+            <a:ext cx="905803" cy="530330"/>
+          </a:xfrm>
+          <a:prstGeom prst="rect">
+            <a:avLst/>
+          </a:prstGeom>
+          <a:solidFill>
+            <a:srgbClr val="85DFFF">
+              <a:alpha val="25098"/>
+            </a:srgbClr>
+          </a:solidFill>
+          <a:ln>
+            <a:noFill/>
+          </a:ln>
+        </p:spPr>
+        <p:style>
+          <a:lnRef idx="2">
+            <a:schemeClr val="accent1">
+              <a:shade val="50000"/>
+            </a:schemeClr>
+          </a:lnRef>
+          <a:fillRef idx="1">
+            <a:schemeClr val="accent1"/>
+          </a:fillRef>
+          <a:effectRef idx="0">
+            <a:schemeClr val="accent1"/>
+          </a:effectRef>
+          <a:fontRef idx="minor">
+            <a:schemeClr val="lt1"/>
+          </a:fontRef>
+        </p:style>
+        <p:txBody>
+          <a:bodyPr rtlCol="1" anchor="ctr"/>
+          <a:lstStyle/>
+          <a:p>
+            <a:pPr algn="ctr"/>
+            <a:endParaRPr lang="he-IL"/>
+          </a:p>
+        </p:txBody>
+      </p:sp>
+      <p:sp>
+        <p:nvSpPr>
+          <p:cNvPr id="7" name="מלבן 6">
+            <a:hlinkClick r:id="rId4" action="ppaction://hlinksldjump"/>
+            <a:extLst>
+              <a:ext uri="{FF2B5EF4-FFF2-40B4-BE49-F238E27FC236}">
+                <a16:creationId xmlns:a16="http://schemas.microsoft.com/office/drawing/2014/main" id="{D769B4D6-5D49-1F7C-5585-0D192A900B8E}"/>
+              </a:ext>
+            </a:extLst>
+          </p:cNvPr>
+          <p:cNvSpPr/>
+          <p:nvPr/>
+        </p:nvSpPr>
+        <p:spPr>
+          <a:xfrm>
+            <a:off x="6736080" y="4934408"/>
+            <a:ext cx="905803" cy="530330"/>
+          </a:xfrm>
+          <a:prstGeom prst="rect">
+            <a:avLst/>
+          </a:prstGeom>
+          <a:solidFill>
+            <a:srgbClr val="85DFFF">
+              <a:alpha val="25098"/>
+            </a:srgbClr>
+          </a:solidFill>
+          <a:ln>
+            <a:noFill/>
+          </a:ln>
+        </p:spPr>
+        <p:style>
+          <a:lnRef idx="2">
+            <a:schemeClr val="accent1">
+              <a:shade val="50000"/>
+            </a:schemeClr>
+          </a:lnRef>
+          <a:fillRef idx="1">
+            <a:schemeClr val="accent1"/>
+          </a:fillRef>
+          <a:effectRef idx="0">
+            <a:schemeClr val="accent1"/>
+          </a:effectRef>
+          <a:fontRef idx="minor">
+            <a:schemeClr val="lt1"/>
+          </a:fontRef>
+        </p:style>
+        <p:txBody>
+          <a:bodyPr rtlCol="1" anchor="ctr"/>
+          <a:lstStyle/>
+          <a:p>
+            <a:pPr algn="ctr"/>
+            <a:endParaRPr lang="he-IL"/>
+          </a:p>
+        </p:txBody>
+      </p:sp>
+      <p:sp>
+        <p:nvSpPr>
+          <p:cNvPr id="8" name="מלבן 7">
+            <a:hlinkClick r:id="rId4" action="ppaction://hlinksldjump"/>
+            <a:extLst>
+              <a:ext uri="{FF2B5EF4-FFF2-40B4-BE49-F238E27FC236}">
+                <a16:creationId xmlns:a16="http://schemas.microsoft.com/office/drawing/2014/main" id="{AEFB79AB-03B1-1C52-7DA9-570FAB0EF4E1}"/>
+              </a:ext>
+            </a:extLst>
+          </p:cNvPr>
+          <p:cNvSpPr/>
+          <p:nvPr/>
+        </p:nvSpPr>
+        <p:spPr>
+          <a:xfrm>
+            <a:off x="4550118" y="4782008"/>
+            <a:ext cx="905803" cy="530330"/>
+          </a:xfrm>
+          <a:prstGeom prst="rect">
+            <a:avLst/>
+          </a:prstGeom>
+          <a:solidFill>
+            <a:srgbClr val="85DFFF">
+              <a:alpha val="25098"/>
+            </a:srgbClr>
+          </a:solidFill>
+          <a:ln>
+            <a:noFill/>
+          </a:ln>
+        </p:spPr>
+        <p:style>
+          <a:lnRef idx="2">
+            <a:schemeClr val="accent1">
+              <a:shade val="50000"/>
+            </a:schemeClr>
+          </a:lnRef>
+          <a:fillRef idx="1">
+            <a:schemeClr val="accent1"/>
+          </a:fillRef>
+          <a:effectRef idx="0">
+            <a:schemeClr val="accent1"/>
+          </a:effectRef>
+          <a:fontRef idx="minor">
+            <a:schemeClr val="lt1"/>
+          </a:fontRef>
+        </p:style>
+        <p:txBody>
+          <a:bodyPr rtlCol="1" anchor="ctr"/>
+          <a:lstStyle/>
+          <a:p>
+            <a:pPr algn="ctr"/>
+            <a:endParaRPr lang="he-IL"/>
+          </a:p>
+        </p:txBody>
+      </p:sp>
     </p:spTree>
     <p:extLst>
       <p:ext uri="{BB962C8B-B14F-4D97-AF65-F5344CB8AC3E}">
@@ -4554,6 +7006,219 @@
           </a:xfrm>
         </p:spPr>
       </p:pic>
+      <p:sp>
+        <p:nvSpPr>
+          <p:cNvPr id="6" name="מלבן 5">
+            <a:hlinkClick r:id="rId3" action="ppaction://hlinksldjump"/>
+            <a:extLst>
+              <a:ext uri="{FF2B5EF4-FFF2-40B4-BE49-F238E27FC236}">
+                <a16:creationId xmlns:a16="http://schemas.microsoft.com/office/drawing/2014/main" id="{428D7902-00D7-0B56-C92C-B9E5B9A2392D}"/>
+              </a:ext>
+            </a:extLst>
+          </p:cNvPr>
+          <p:cNvSpPr/>
+          <p:nvPr/>
+        </p:nvSpPr>
+        <p:spPr>
+          <a:xfrm>
+            <a:off x="2030437" y="2019830"/>
+            <a:ext cx="905803" cy="530330"/>
+          </a:xfrm>
+          <a:prstGeom prst="rect">
+            <a:avLst/>
+          </a:prstGeom>
+          <a:solidFill>
+            <a:srgbClr val="85DFFF">
+              <a:alpha val="25098"/>
+            </a:srgbClr>
+          </a:solidFill>
+          <a:ln>
+            <a:noFill/>
+          </a:ln>
+        </p:spPr>
+        <p:style>
+          <a:lnRef idx="2">
+            <a:schemeClr val="accent1">
+              <a:shade val="50000"/>
+            </a:schemeClr>
+          </a:lnRef>
+          <a:fillRef idx="1">
+            <a:schemeClr val="accent1"/>
+          </a:fillRef>
+          <a:effectRef idx="0">
+            <a:schemeClr val="accent1"/>
+          </a:effectRef>
+          <a:fontRef idx="minor">
+            <a:schemeClr val="lt1"/>
+          </a:fontRef>
+        </p:style>
+        <p:txBody>
+          <a:bodyPr rtlCol="1" anchor="ctr"/>
+          <a:lstStyle/>
+          <a:p>
+            <a:pPr algn="ctr"/>
+            <a:endParaRPr lang="he-IL"/>
+          </a:p>
+        </p:txBody>
+      </p:sp>
+      <p:sp>
+        <p:nvSpPr>
+          <p:cNvPr id="7" name="מלבן 6">
+            <a:hlinkClick r:id="rId4" action="ppaction://hlinksldjump"/>
+            <a:extLst>
+              <a:ext uri="{FF2B5EF4-FFF2-40B4-BE49-F238E27FC236}">
+                <a16:creationId xmlns:a16="http://schemas.microsoft.com/office/drawing/2014/main" id="{E865C8B6-AF2F-4D91-4F2C-0842BF94E9BC}"/>
+              </a:ext>
+            </a:extLst>
+          </p:cNvPr>
+          <p:cNvSpPr/>
+          <p:nvPr/>
+        </p:nvSpPr>
+        <p:spPr>
+          <a:xfrm>
+            <a:off x="5190197" y="5330648"/>
+            <a:ext cx="1596683" cy="530330"/>
+          </a:xfrm>
+          <a:prstGeom prst="rect">
+            <a:avLst/>
+          </a:prstGeom>
+          <a:solidFill>
+            <a:srgbClr val="85DFFF">
+              <a:alpha val="25098"/>
+            </a:srgbClr>
+          </a:solidFill>
+          <a:ln>
+            <a:noFill/>
+          </a:ln>
+        </p:spPr>
+        <p:style>
+          <a:lnRef idx="2">
+            <a:schemeClr val="accent1">
+              <a:shade val="50000"/>
+            </a:schemeClr>
+          </a:lnRef>
+          <a:fillRef idx="1">
+            <a:schemeClr val="accent1"/>
+          </a:fillRef>
+          <a:effectRef idx="0">
+            <a:schemeClr val="accent1"/>
+          </a:effectRef>
+          <a:fontRef idx="minor">
+            <a:schemeClr val="lt1"/>
+          </a:fontRef>
+        </p:style>
+        <p:txBody>
+          <a:bodyPr rtlCol="1" anchor="ctr"/>
+          <a:lstStyle/>
+          <a:p>
+            <a:pPr algn="ctr"/>
+            <a:endParaRPr lang="he-IL"/>
+          </a:p>
+        </p:txBody>
+      </p:sp>
+      <p:sp>
+        <p:nvSpPr>
+          <p:cNvPr id="8" name="מלבן 7">
+            <a:extLst>
+              <a:ext uri="{FF2B5EF4-FFF2-40B4-BE49-F238E27FC236}">
+                <a16:creationId xmlns:a16="http://schemas.microsoft.com/office/drawing/2014/main" id="{4A955139-9BB0-80AA-6C3D-550F8C064471}"/>
+              </a:ext>
+            </a:extLst>
+          </p:cNvPr>
+          <p:cNvSpPr/>
+          <p:nvPr/>
+        </p:nvSpPr>
+        <p:spPr>
+          <a:xfrm>
+            <a:off x="4744720" y="3962400"/>
+            <a:ext cx="2560320" cy="1368248"/>
+          </a:xfrm>
+          <a:prstGeom prst="rect">
+            <a:avLst/>
+          </a:prstGeom>
+          <a:solidFill>
+            <a:schemeClr val="bg1"/>
+          </a:solidFill>
+        </p:spPr>
+        <p:style>
+          <a:lnRef idx="2">
+            <a:schemeClr val="accent1">
+              <a:shade val="50000"/>
+            </a:schemeClr>
+          </a:lnRef>
+          <a:fillRef idx="1">
+            <a:schemeClr val="accent1"/>
+          </a:fillRef>
+          <a:effectRef idx="0">
+            <a:schemeClr val="accent1"/>
+          </a:effectRef>
+          <a:fontRef idx="minor">
+            <a:schemeClr val="lt1"/>
+          </a:fontRef>
+        </p:style>
+        <p:txBody>
+          <a:bodyPr rtlCol="1" anchor="ctr"/>
+          <a:lstStyle/>
+          <a:p>
+            <a:pPr algn="ctr"/>
+            <a:endParaRPr lang="he-IL"/>
+          </a:p>
+        </p:txBody>
+      </p:sp>
+      <p:sp>
+        <p:nvSpPr>
+          <p:cNvPr id="9" name="מלבן 8">
+            <a:extLst>
+              <a:ext uri="{FF2B5EF4-FFF2-40B4-BE49-F238E27FC236}">
+                <a16:creationId xmlns:a16="http://schemas.microsoft.com/office/drawing/2014/main" id="{237C646A-EC3B-FC8B-351A-7DEF21114244}"/>
+              </a:ext>
+            </a:extLst>
+          </p:cNvPr>
+          <p:cNvSpPr/>
+          <p:nvPr/>
+        </p:nvSpPr>
+        <p:spPr>
+          <a:xfrm>
+            <a:off x="6489713" y="3466766"/>
+            <a:ext cx="561327" cy="495634"/>
+          </a:xfrm>
+          <a:prstGeom prst="rect">
+            <a:avLst/>
+          </a:prstGeom>
+          <a:solidFill>
+            <a:srgbClr val="85DFFF">
+              <a:alpha val="25098"/>
+            </a:srgbClr>
+          </a:solidFill>
+          <a:ln>
+            <a:noFill/>
+          </a:ln>
+        </p:spPr>
+        <p:style>
+          <a:lnRef idx="2">
+            <a:schemeClr val="accent1">
+              <a:shade val="50000"/>
+            </a:schemeClr>
+          </a:lnRef>
+          <a:fillRef idx="1">
+            <a:schemeClr val="accent1"/>
+          </a:fillRef>
+          <a:effectRef idx="0">
+            <a:schemeClr val="accent1"/>
+          </a:effectRef>
+          <a:fontRef idx="minor">
+            <a:schemeClr val="lt1"/>
+          </a:fontRef>
+        </p:style>
+        <p:txBody>
+          <a:bodyPr rtlCol="1" anchor="ctr"/>
+          <a:lstStyle/>
+          <a:p>
+            <a:pPr algn="ctr"/>
+            <a:endParaRPr lang="he-IL"/>
+          </a:p>
+        </p:txBody>
+      </p:sp>
     </p:spTree>
     <p:extLst>
       <p:ext uri="{BB962C8B-B14F-4D97-AF65-F5344CB8AC3E}">
@@ -4564,6 +7229,115 @@
   <p:clrMapOvr>
     <a:masterClrMapping/>
   </p:clrMapOvr>
+  <p:timing>
+    <p:tnLst>
+      <p:par>
+        <p:cTn id="1" dur="indefinite" restart="never" nodeType="tmRoot">
+          <p:childTnLst>
+            <p:seq concurrent="1" nextAc="seek">
+              <p:cTn id="2" restart="whenNotActive" fill="hold" evtFilter="cancelBubble" nodeType="interactiveSeq">
+                <p:stCondLst>
+                  <p:cond evt="onClick" delay="0">
+                    <p:tgtEl>
+                      <p:spTgt spid="9"/>
+                    </p:tgtEl>
+                  </p:cond>
+                </p:stCondLst>
+                <p:endSync evt="end" delay="0">
+                  <p:rtn val="all"/>
+                </p:endSync>
+                <p:childTnLst>
+                  <p:par>
+                    <p:cTn id="3" fill="hold">
+                      <p:stCondLst>
+                        <p:cond delay="0"/>
+                      </p:stCondLst>
+                      <p:childTnLst>
+                        <p:par>
+                          <p:cTn id="4" fill="hold">
+                            <p:stCondLst>
+                              <p:cond delay="0"/>
+                            </p:stCondLst>
+                            <p:childTnLst>
+                              <p:par>
+                                <p:cTn id="5" presetID="1" presetClass="exit" presetSubtype="0" fill="hold" grpId="0" nodeType="clickEffect">
+                                  <p:stCondLst>
+                                    <p:cond delay="0"/>
+                                  </p:stCondLst>
+                                  <p:childTnLst>
+                                    <p:set>
+                                      <p:cBhvr>
+                                        <p:cTn id="6" dur="1" fill="hold">
+                                          <p:stCondLst>
+                                            <p:cond delay="0"/>
+                                          </p:stCondLst>
+                                        </p:cTn>
+                                        <p:tgtEl>
+                                          <p:spTgt spid="8"/>
+                                        </p:tgtEl>
+                                        <p:attrNameLst>
+                                          <p:attrName>style.visibility</p:attrName>
+                                        </p:attrNameLst>
+                                      </p:cBhvr>
+                                      <p:to>
+                                        <p:strVal val="hidden"/>
+                                      </p:to>
+                                    </p:set>
+                                  </p:childTnLst>
+                                </p:cTn>
+                              </p:par>
+                              <p:par>
+                                <p:cTn id="7" presetID="1" presetClass="entr" presetSubtype="0" fill="hold" grpId="0" nodeType="withEffect">
+                                  <p:stCondLst>
+                                    <p:cond delay="0"/>
+                                  </p:stCondLst>
+                                  <p:childTnLst>
+                                    <p:set>
+                                      <p:cBhvr>
+                                        <p:cTn id="8" dur="1" fill="hold">
+                                          <p:stCondLst>
+                                            <p:cond delay="0"/>
+                                          </p:stCondLst>
+                                        </p:cTn>
+                                        <p:tgtEl>
+                                          <p:spTgt spid="7"/>
+                                        </p:tgtEl>
+                                        <p:attrNameLst>
+                                          <p:attrName>style.visibility</p:attrName>
+                                        </p:attrNameLst>
+                                      </p:cBhvr>
+                                      <p:to>
+                                        <p:strVal val="visible"/>
+                                      </p:to>
+                                    </p:set>
+                                  </p:childTnLst>
+                                </p:cTn>
+                              </p:par>
+                            </p:childTnLst>
+                          </p:cTn>
+                        </p:par>
+                      </p:childTnLst>
+                    </p:cTn>
+                  </p:par>
+                </p:childTnLst>
+              </p:cTn>
+              <p:nextCondLst>
+                <p:cond evt="onClick" delay="0">
+                  <p:tgtEl>
+                    <p:spTgt spid="9"/>
+                  </p:tgtEl>
+                </p:cond>
+              </p:nextCondLst>
+            </p:seq>
+          </p:childTnLst>
+        </p:cTn>
+      </p:par>
+    </p:tnLst>
+    <p:bldLst>
+      <p:bldP spid="7" grpId="0" animBg="1"/>
+      <p:bldP spid="8" grpId="0" animBg="1"/>
+    </p:bldLst>
+  </p:timing>
 </p:sld>
 </file>
 

</xml_diff>